<commit_message>
Add consumptive to presentation
</commit_message>
<xml_diff>
--- a/presentation/Gestione Casinò.pptx
+++ b/presentation/Gestione Casinò.pptx
@@ -9,24 +9,25 @@
     <p:sldId id="257" r:id="rId3"/>
     <p:sldId id="258" r:id="rId4"/>
     <p:sldId id="259" r:id="rId5"/>
-    <p:sldId id="260" r:id="rId6"/>
-    <p:sldId id="261" r:id="rId7"/>
-    <p:sldId id="262" r:id="rId8"/>
-    <p:sldId id="263" r:id="rId9"/>
-    <p:sldId id="264" r:id="rId10"/>
-    <p:sldId id="265" r:id="rId11"/>
-    <p:sldId id="266" r:id="rId12"/>
-    <p:sldId id="267" r:id="rId13"/>
-    <p:sldId id="271" r:id="rId14"/>
-    <p:sldId id="268" r:id="rId15"/>
-    <p:sldId id="269" r:id="rId16"/>
-    <p:sldId id="270" r:id="rId17"/>
-    <p:sldId id="272" r:id="rId18"/>
-    <p:sldId id="273" r:id="rId19"/>
-    <p:sldId id="274" r:id="rId20"/>
-    <p:sldId id="275" r:id="rId21"/>
-    <p:sldId id="276" r:id="rId22"/>
-    <p:sldId id="277" r:id="rId23"/>
+    <p:sldId id="278" r:id="rId6"/>
+    <p:sldId id="260" r:id="rId7"/>
+    <p:sldId id="261" r:id="rId8"/>
+    <p:sldId id="262" r:id="rId9"/>
+    <p:sldId id="263" r:id="rId10"/>
+    <p:sldId id="264" r:id="rId11"/>
+    <p:sldId id="265" r:id="rId12"/>
+    <p:sldId id="266" r:id="rId13"/>
+    <p:sldId id="267" r:id="rId14"/>
+    <p:sldId id="271" r:id="rId15"/>
+    <p:sldId id="268" r:id="rId16"/>
+    <p:sldId id="269" r:id="rId17"/>
+    <p:sldId id="270" r:id="rId18"/>
+    <p:sldId id="272" r:id="rId19"/>
+    <p:sldId id="273" r:id="rId20"/>
+    <p:sldId id="274" r:id="rId21"/>
+    <p:sldId id="275" r:id="rId22"/>
+    <p:sldId id="276" r:id="rId23"/>
+    <p:sldId id="277" r:id="rId24"/>
   </p:sldIdLst>
   <p:sldSz cx="12192000" cy="6858000"/>
   <p:notesSz cx="6858000" cy="9144000"/>
@@ -228,7 +229,7 @@
           <a:effectLst/>
           <a:extLst>
             <a:ext uri="{91240B29-F687-4f45-9708-019B960494DF}">
-              <a14:hiddenLine xmlns="" xmlns:a14="http://schemas.microsoft.com/office/drawing/2010/main" w="9525">
+              <a14:hiddenLine xmlns:a14="http://schemas.microsoft.com/office/drawing/2010/main" xmlns="" w="9525">
                 <a:solidFill>
                   <a:srgbClr val="000000"/>
                 </a:solidFill>
@@ -279,7 +280,7 @@
           </a:lstStyle>
           <a:p>
             <a:r>
-              <a:rPr lang="en-US" smtClean="0"/>
+              <a:rPr lang="en-US"/>
               <a:t>Click to edit Master title style</a:t>
             </a:r>
             <a:endParaRPr lang="en-US" dirty="0"/>
@@ -396,7 +397,7 @@
           </a:lstStyle>
           <a:p>
             <a:r>
-              <a:rPr lang="en-US" smtClean="0"/>
+              <a:rPr lang="en-US"/>
               <a:t>Click to edit Master subtitle style</a:t>
             </a:r>
             <a:endParaRPr lang="en-US" dirty="0"/>
@@ -421,7 +422,7 @@
             <a:fld id="{08B9EBBA-996F-894A-B54A-D6246ED52CEA}" type="datetimeFigureOut">
               <a:rPr lang="en-US" dirty="0"/>
               <a:pPr/>
-              <a:t>5/17/2019</a:t>
+              <a:t>5/22/2019</a:t>
             </a:fld>
             <a:endParaRPr lang="en-US" dirty="0"/>
           </a:p>
@@ -464,7 +465,7 @@
             <a:fld id="{D57F1E4F-1CFF-5643-939E-217C01CDF565}" type="slidenum">
               <a:rPr lang="en-US" dirty="0"/>
               <a:pPr/>
-              <a:t>‹#›</a:t>
+              <a:t>‹N›</a:t>
             </a:fld>
             <a:endParaRPr lang="en-US" dirty="0"/>
           </a:p>
@@ -522,7 +523,7 @@
           </a:lstStyle>
           <a:p>
             <a:r>
-              <a:rPr lang="en-US" smtClean="0"/>
+              <a:rPr lang="en-US"/>
               <a:t>Click to edit Master title style</a:t>
             </a:r>
             <a:endParaRPr lang="en-US" dirty="0"/>
@@ -644,7 +645,7 @@
           </a:lstStyle>
           <a:p>
             <a:r>
-              <a:rPr lang="en-US" smtClean="0"/>
+              <a:rPr lang="en-US"/>
               <a:t>Click icon to add picture</a:t>
             </a:r>
             <a:endParaRPr lang="en-US" dirty="0"/>
@@ -712,7 +713,7 @@
           <a:p>
             <a:pPr lvl="0"/>
             <a:r>
-              <a:rPr lang="en-US" smtClean="0"/>
+              <a:rPr lang="en-US"/>
               <a:t>Edit Master text styles</a:t>
             </a:r>
           </a:p>
@@ -736,7 +737,7 @@
             <a:fld id="{18C79C5D-2A6F-F04D-97DA-BEF2467B64E4}" type="datetimeFigureOut">
               <a:rPr lang="en-US" dirty="0"/>
               <a:pPr/>
-              <a:t>5/17/2019</a:t>
+              <a:t>5/22/2019</a:t>
             </a:fld>
             <a:endParaRPr lang="en-US" dirty="0"/>
           </a:p>
@@ -779,7 +780,7 @@
             <a:fld id="{D57F1E4F-1CFF-5643-939E-217C01CDF565}" type="slidenum">
               <a:rPr lang="en-US" dirty="0"/>
               <a:pPr/>
-              <a:t>‹#›</a:t>
+              <a:t>‹N›</a:t>
             </a:fld>
             <a:endParaRPr lang="en-US" dirty="0"/>
           </a:p>
@@ -1043,7 +1044,7 @@
           </a:lstStyle>
           <a:p>
             <a:r>
-              <a:rPr lang="en-US" smtClean="0"/>
+              <a:rPr lang="en-US"/>
               <a:t>Click to edit Master title style</a:t>
             </a:r>
             <a:endParaRPr lang="en-US" dirty="0"/>
@@ -1163,7 +1164,7 @@
           <a:p>
             <a:pPr lvl="0"/>
             <a:r>
-              <a:rPr lang="en-US" smtClean="0"/>
+              <a:rPr lang="en-US"/>
               <a:t>Edit Master text styles</a:t>
             </a:r>
           </a:p>
@@ -1197,7 +1198,7 @@
           <a:p>
             <a:pPr lvl="0"/>
             <a:r>
-              <a:rPr lang="en-US" smtClean="0"/>
+              <a:rPr lang="en-US"/>
               <a:t>Edit Master text styles</a:t>
             </a:r>
           </a:p>
@@ -1221,7 +1222,7 @@
             <a:fld id="{8DFA1846-DA80-1C48-A609-854EA85C59AD}" type="datetimeFigureOut">
               <a:rPr lang="en-US" dirty="0"/>
               <a:pPr/>
-              <a:t>5/17/2019</a:t>
+              <a:t>5/22/2019</a:t>
             </a:fld>
             <a:endParaRPr lang="en-US" dirty="0"/>
           </a:p>
@@ -1264,7 +1265,7 @@
             <a:fld id="{D57F1E4F-1CFF-5643-939E-217C01CDF565}" type="slidenum">
               <a:rPr lang="en-US" dirty="0"/>
               <a:pPr/>
-              <a:t>‹#›</a:t>
+              <a:t>‹N›</a:t>
             </a:fld>
             <a:endParaRPr lang="en-US" dirty="0"/>
           </a:p>
@@ -1528,7 +1529,7 @@
           </a:lstStyle>
           <a:p>
             <a:r>
-              <a:rPr lang="en-US" smtClean="0"/>
+              <a:rPr lang="en-US"/>
               <a:t>Click to edit Master title style</a:t>
             </a:r>
             <a:endParaRPr lang="en-US" dirty="0"/>
@@ -1563,7 +1564,7 @@
           <a:p>
             <a:pPr lvl="0"/>
             <a:r>
-              <a:rPr lang="en-US" smtClean="0"/>
+              <a:rPr lang="en-US"/>
               <a:t>Edit Master text styles</a:t>
             </a:r>
           </a:p>
@@ -1587,7 +1588,7 @@
             <a:fld id="{FBF54567-0DE4-3F47-BF90-CB84690072F9}" type="datetimeFigureOut">
               <a:rPr lang="en-US" dirty="0"/>
               <a:pPr/>
-              <a:t>5/17/2019</a:t>
+              <a:t>5/22/2019</a:t>
             </a:fld>
             <a:endParaRPr lang="en-US" dirty="0"/>
           </a:p>
@@ -1630,7 +1631,7 @@
             <a:fld id="{D57F1E4F-1CFF-5643-939E-217C01CDF565}" type="slidenum">
               <a:rPr lang="en-US" dirty="0"/>
               <a:pPr/>
-              <a:t>‹#›</a:t>
+              <a:t>‹N›</a:t>
             </a:fld>
             <a:endParaRPr lang="en-US" dirty="0"/>
           </a:p>
@@ -1738,7 +1739,7 @@
           <a:ln/>
           <a:extLst>
             <a:ext uri="{91240B29-F687-4f45-9708-019B960494DF}">
-              <a14:hiddenLine xmlns="" xmlns:a14="http://schemas.microsoft.com/office/drawing/2010/main" w="9525">
+              <a14:hiddenLine xmlns:a14="http://schemas.microsoft.com/office/drawing/2010/main" xmlns="" w="9525">
                 <a:solidFill>
                   <a:srgbClr val="000000"/>
                 </a:solidFill>
@@ -1780,7 +1781,7 @@
           <a:lstStyle/>
           <a:p>
             <a:r>
-              <a:rPr lang="en-US" smtClean="0"/>
+              <a:rPr lang="en-US"/>
               <a:t>Click to edit Master title style</a:t>
             </a:r>
             <a:endParaRPr lang="en-US" dirty="0"/>
@@ -1804,35 +1805,35 @@
           <a:p>
             <a:pPr lvl="0"/>
             <a:r>
-              <a:rPr lang="en-US" smtClean="0"/>
+              <a:rPr lang="en-US"/>
               <a:t>Edit Master text styles</a:t>
             </a:r>
           </a:p>
           <a:p>
             <a:pPr lvl="1"/>
             <a:r>
-              <a:rPr lang="en-US" smtClean="0"/>
+              <a:rPr lang="en-US"/>
               <a:t>Second level</a:t>
             </a:r>
           </a:p>
           <a:p>
             <a:pPr lvl="2"/>
             <a:r>
-              <a:rPr lang="en-US" smtClean="0"/>
+              <a:rPr lang="en-US"/>
               <a:t>Third level</a:t>
             </a:r>
           </a:p>
           <a:p>
             <a:pPr lvl="3"/>
             <a:r>
-              <a:rPr lang="en-US" smtClean="0"/>
+              <a:rPr lang="en-US"/>
               <a:t>Fourth level</a:t>
             </a:r>
           </a:p>
           <a:p>
             <a:pPr lvl="4"/>
             <a:r>
-              <a:rPr lang="en-US" smtClean="0"/>
+              <a:rPr lang="en-US"/>
               <a:t>Fifth level</a:t>
             </a:r>
             <a:endParaRPr lang="en-US" dirty="0"/>
@@ -1857,7 +1858,7 @@
             <a:fld id="{C6C52C72-DE31-F449-A4ED-4C594FD91407}" type="datetimeFigureOut">
               <a:rPr lang="en-US" dirty="0"/>
               <a:pPr/>
-              <a:t>5/17/2019</a:t>
+              <a:t>5/22/2019</a:t>
             </a:fld>
             <a:endParaRPr lang="en-US" dirty="0"/>
           </a:p>
@@ -1900,7 +1901,7 @@
             <a:fld id="{D57F1E4F-1CFF-5643-939E-217C01CDF565}" type="slidenum">
               <a:rPr lang="en-US" dirty="0"/>
               <a:pPr/>
-              <a:t>‹#›</a:t>
+              <a:t>‹N›</a:t>
             </a:fld>
             <a:endParaRPr lang="en-US" dirty="0"/>
           </a:p>
@@ -2010,7 +2011,7 @@
           <a:ln/>
           <a:extLst>
             <a:ext uri="{91240B29-F687-4f45-9708-019B960494DF}">
-              <a14:hiddenLine xmlns="" xmlns:a14="http://schemas.microsoft.com/office/drawing/2010/main" w="9525">
+              <a14:hiddenLine xmlns:a14="http://schemas.microsoft.com/office/drawing/2010/main" xmlns="" w="9525">
                 <a:solidFill>
                   <a:srgbClr val="000000"/>
                 </a:solidFill>
@@ -2057,7 +2058,7 @@
           <a:lstStyle/>
           <a:p>
             <a:r>
-              <a:rPr lang="en-US" smtClean="0"/>
+              <a:rPr lang="en-US"/>
               <a:t>Click to edit Master title style</a:t>
             </a:r>
             <a:endParaRPr lang="en-US" dirty="0"/>
@@ -2086,35 +2087,35 @@
           <a:p>
             <a:pPr lvl="0"/>
             <a:r>
-              <a:rPr lang="en-US" smtClean="0"/>
+              <a:rPr lang="en-US"/>
               <a:t>Edit Master text styles</a:t>
             </a:r>
           </a:p>
           <a:p>
             <a:pPr lvl="1"/>
             <a:r>
-              <a:rPr lang="en-US" smtClean="0"/>
+              <a:rPr lang="en-US"/>
               <a:t>Second level</a:t>
             </a:r>
           </a:p>
           <a:p>
             <a:pPr lvl="2"/>
             <a:r>
-              <a:rPr lang="en-US" smtClean="0"/>
+              <a:rPr lang="en-US"/>
               <a:t>Third level</a:t>
             </a:r>
           </a:p>
           <a:p>
             <a:pPr lvl="3"/>
             <a:r>
-              <a:rPr lang="en-US" smtClean="0"/>
+              <a:rPr lang="en-US"/>
               <a:t>Fourth level</a:t>
             </a:r>
           </a:p>
           <a:p>
             <a:pPr lvl="4"/>
             <a:r>
-              <a:rPr lang="en-US" smtClean="0"/>
+              <a:rPr lang="en-US"/>
               <a:t>Fifth level</a:t>
             </a:r>
             <a:endParaRPr lang="en-US" dirty="0"/>
@@ -2139,7 +2140,7 @@
             <a:fld id="{ED62726E-379B-B349-9EED-81ED093FA806}" type="datetimeFigureOut">
               <a:rPr lang="en-US" dirty="0"/>
               <a:pPr/>
-              <a:t>5/17/2019</a:t>
+              <a:t>5/22/2019</a:t>
             </a:fld>
             <a:endParaRPr lang="en-US" dirty="0"/>
           </a:p>
@@ -2182,7 +2183,7 @@
             <a:fld id="{D57F1E4F-1CFF-5643-939E-217C01CDF565}" type="slidenum">
               <a:rPr lang="en-US" dirty="0"/>
               <a:pPr/>
-              <a:t>‹#›</a:t>
+              <a:t>‹N›</a:t>
             </a:fld>
             <a:endParaRPr lang="en-US" dirty="0"/>
           </a:p>
@@ -2290,7 +2291,7 @@
           <a:ln/>
           <a:extLst>
             <a:ext uri="{91240B29-F687-4f45-9708-019B960494DF}">
-              <a14:hiddenLine xmlns="" xmlns:a14="http://schemas.microsoft.com/office/drawing/2010/main" w="9525">
+              <a14:hiddenLine xmlns:a14="http://schemas.microsoft.com/office/drawing/2010/main" xmlns="" w="9525">
                 <a:solidFill>
                   <a:srgbClr val="000000"/>
                 </a:solidFill>
@@ -2337,7 +2338,7 @@
           <a:lstStyle/>
           <a:p>
             <a:r>
-              <a:rPr lang="en-US" smtClean="0"/>
+              <a:rPr lang="en-US"/>
               <a:t>Click to edit Master title style</a:t>
             </a:r>
             <a:endParaRPr lang="en-US" dirty="0"/>
@@ -2366,35 +2367,35 @@
           <a:p>
             <a:pPr lvl="0"/>
             <a:r>
-              <a:rPr lang="en-US" smtClean="0"/>
+              <a:rPr lang="en-US"/>
               <a:t>Edit Master text styles</a:t>
             </a:r>
           </a:p>
           <a:p>
             <a:pPr lvl="1"/>
             <a:r>
-              <a:rPr lang="en-US" smtClean="0"/>
+              <a:rPr lang="en-US"/>
               <a:t>Second level</a:t>
             </a:r>
           </a:p>
           <a:p>
             <a:pPr lvl="2"/>
             <a:r>
-              <a:rPr lang="en-US" smtClean="0"/>
+              <a:rPr lang="en-US"/>
               <a:t>Third level</a:t>
             </a:r>
           </a:p>
           <a:p>
             <a:pPr lvl="3"/>
             <a:r>
-              <a:rPr lang="en-US" smtClean="0"/>
+              <a:rPr lang="en-US"/>
               <a:t>Fourth level</a:t>
             </a:r>
           </a:p>
           <a:p>
             <a:pPr lvl="4"/>
             <a:r>
-              <a:rPr lang="en-US" smtClean="0"/>
+              <a:rPr lang="en-US"/>
               <a:t>Fifth level</a:t>
             </a:r>
             <a:endParaRPr lang="en-US" dirty="0"/>
@@ -2419,7 +2420,7 @@
             <a:fld id="{9B3A1323-8D79-1946-B0D7-40001CF92E9D}" type="datetimeFigureOut">
               <a:rPr lang="en-US" dirty="0"/>
               <a:pPr/>
-              <a:t>5/17/2019</a:t>
+              <a:t>5/22/2019</a:t>
             </a:fld>
             <a:endParaRPr lang="en-US" dirty="0"/>
           </a:p>
@@ -2462,7 +2463,7 @@
             <a:fld id="{D57F1E4F-1CFF-5643-939E-217C01CDF565}" type="slidenum">
               <a:rPr lang="en-US" dirty="0"/>
               <a:pPr/>
-              <a:t>‹#›</a:t>
+              <a:t>‹N›</a:t>
             </a:fld>
             <a:endParaRPr lang="en-US" dirty="0"/>
           </a:p>
@@ -2615,7 +2616,7 @@
           </a:lstStyle>
           <a:p>
             <a:r>
-              <a:rPr lang="en-US" smtClean="0"/>
+              <a:rPr lang="en-US"/>
               <a:t>Click to edit Master title style</a:t>
             </a:r>
             <a:endParaRPr lang="en-US" dirty="0"/>
@@ -2735,7 +2736,7 @@
           <a:p>
             <a:pPr lvl="0"/>
             <a:r>
-              <a:rPr lang="en-US" smtClean="0"/>
+              <a:rPr lang="en-US"/>
               <a:t>Edit Master text styles</a:t>
             </a:r>
           </a:p>
@@ -2759,7 +2760,7 @@
             <a:fld id="{8DFA1846-DA80-1C48-A609-854EA85C59AD}" type="datetimeFigureOut">
               <a:rPr lang="en-US" dirty="0"/>
               <a:pPr/>
-              <a:t>5/17/2019</a:t>
+              <a:t>5/22/2019</a:t>
             </a:fld>
             <a:endParaRPr lang="en-US" dirty="0"/>
           </a:p>
@@ -2802,7 +2803,7 @@
             <a:fld id="{D57F1E4F-1CFF-5643-939E-217C01CDF565}" type="slidenum">
               <a:rPr lang="en-US" dirty="0"/>
               <a:pPr/>
-              <a:t>‹#›</a:t>
+              <a:t>‹N›</a:t>
             </a:fld>
             <a:endParaRPr lang="en-US" dirty="0"/>
           </a:p>
@@ -2910,7 +2911,7 @@
           <a:ln/>
           <a:extLst>
             <a:ext uri="{91240B29-F687-4f45-9708-019B960494DF}">
-              <a14:hiddenLine xmlns="" xmlns:a14="http://schemas.microsoft.com/office/drawing/2010/main" w="9525">
+              <a14:hiddenLine xmlns:a14="http://schemas.microsoft.com/office/drawing/2010/main" xmlns="" w="9525">
                 <a:solidFill>
                   <a:srgbClr val="000000"/>
                 </a:solidFill>
@@ -2952,7 +2953,7 @@
           <a:lstStyle/>
           <a:p>
             <a:r>
-              <a:rPr lang="en-US" smtClean="0"/>
+              <a:rPr lang="en-US"/>
               <a:t>Click to edit Master title style</a:t>
             </a:r>
             <a:endParaRPr lang="en-US" dirty="0"/>
@@ -2983,35 +2984,35 @@
           <a:p>
             <a:pPr lvl="0"/>
             <a:r>
-              <a:rPr lang="en-US" smtClean="0"/>
+              <a:rPr lang="en-US"/>
               <a:t>Edit Master text styles</a:t>
             </a:r>
           </a:p>
           <a:p>
             <a:pPr lvl="1"/>
             <a:r>
-              <a:rPr lang="en-US" smtClean="0"/>
+              <a:rPr lang="en-US"/>
               <a:t>Second level</a:t>
             </a:r>
           </a:p>
           <a:p>
             <a:pPr lvl="2"/>
             <a:r>
-              <a:rPr lang="en-US" smtClean="0"/>
+              <a:rPr lang="en-US"/>
               <a:t>Third level</a:t>
             </a:r>
           </a:p>
           <a:p>
             <a:pPr lvl="3"/>
             <a:r>
-              <a:rPr lang="en-US" smtClean="0"/>
+              <a:rPr lang="en-US"/>
               <a:t>Fourth level</a:t>
             </a:r>
           </a:p>
           <a:p>
             <a:pPr lvl="4"/>
             <a:r>
-              <a:rPr lang="en-US" smtClean="0"/>
+              <a:rPr lang="en-US"/>
               <a:t>Fifth level</a:t>
             </a:r>
             <a:endParaRPr lang="en-US" dirty="0"/>
@@ -3042,35 +3043,35 @@
           <a:p>
             <a:pPr lvl="0"/>
             <a:r>
-              <a:rPr lang="en-US" smtClean="0"/>
+              <a:rPr lang="en-US"/>
               <a:t>Edit Master text styles</a:t>
             </a:r>
           </a:p>
           <a:p>
             <a:pPr lvl="1"/>
             <a:r>
-              <a:rPr lang="en-US" smtClean="0"/>
+              <a:rPr lang="en-US"/>
               <a:t>Second level</a:t>
             </a:r>
           </a:p>
           <a:p>
             <a:pPr lvl="2"/>
             <a:r>
-              <a:rPr lang="en-US" smtClean="0"/>
+              <a:rPr lang="en-US"/>
               <a:t>Third level</a:t>
             </a:r>
           </a:p>
           <a:p>
             <a:pPr lvl="3"/>
             <a:r>
-              <a:rPr lang="en-US" smtClean="0"/>
+              <a:rPr lang="en-US"/>
               <a:t>Fourth level</a:t>
             </a:r>
           </a:p>
           <a:p>
             <a:pPr lvl="4"/>
             <a:r>
-              <a:rPr lang="en-US" smtClean="0"/>
+              <a:rPr lang="en-US"/>
               <a:t>Fifth level</a:t>
             </a:r>
             <a:endParaRPr lang="en-US" dirty="0"/>
@@ -3095,7 +3096,7 @@
             <a:fld id="{57302355-E14B-8545-A8F8-0FE83CC9D524}" type="datetimeFigureOut">
               <a:rPr lang="en-US" dirty="0"/>
               <a:pPr/>
-              <a:t>5/17/2019</a:t>
+              <a:t>5/22/2019</a:t>
             </a:fld>
             <a:endParaRPr lang="en-US" dirty="0"/>
           </a:p>
@@ -3138,7 +3139,7 @@
             <a:fld id="{D57F1E4F-1CFF-5643-939E-217C01CDF565}" type="slidenum">
               <a:rPr lang="en-US" dirty="0"/>
               <a:pPr/>
-              <a:t>‹#›</a:t>
+              <a:t>‹N›</a:t>
             </a:fld>
             <a:endParaRPr lang="en-US" dirty="0"/>
           </a:p>
@@ -3246,7 +3247,7 @@
           <a:ln/>
           <a:extLst>
             <a:ext uri="{91240B29-F687-4f45-9708-019B960494DF}">
-              <a14:hiddenLine xmlns="" xmlns:a14="http://schemas.microsoft.com/office/drawing/2010/main" w="9525">
+              <a14:hiddenLine xmlns:a14="http://schemas.microsoft.com/office/drawing/2010/main" xmlns="" w="9525">
                 <a:solidFill>
                   <a:srgbClr val="000000"/>
                 </a:solidFill>
@@ -3292,7 +3293,7 @@
           </a:lstStyle>
           <a:p>
             <a:r>
-              <a:rPr lang="en-US" smtClean="0"/>
+              <a:rPr lang="en-US"/>
               <a:t>Click to edit Master title style</a:t>
             </a:r>
             <a:endParaRPr lang="en-US" dirty="0"/>
@@ -3360,7 +3361,7 @@
           <a:p>
             <a:pPr lvl="0"/>
             <a:r>
-              <a:rPr lang="en-US" smtClean="0"/>
+              <a:rPr lang="en-US"/>
               <a:t>Edit Master text styles</a:t>
             </a:r>
           </a:p>
@@ -3390,35 +3391,35 @@
           <a:p>
             <a:pPr lvl="0"/>
             <a:r>
-              <a:rPr lang="en-US" smtClean="0"/>
+              <a:rPr lang="en-US"/>
               <a:t>Edit Master text styles</a:t>
             </a:r>
           </a:p>
           <a:p>
             <a:pPr lvl="1"/>
             <a:r>
-              <a:rPr lang="en-US" smtClean="0"/>
+              <a:rPr lang="en-US"/>
               <a:t>Second level</a:t>
             </a:r>
           </a:p>
           <a:p>
             <a:pPr lvl="2"/>
             <a:r>
-              <a:rPr lang="en-US" smtClean="0"/>
+              <a:rPr lang="en-US"/>
               <a:t>Third level</a:t>
             </a:r>
           </a:p>
           <a:p>
             <a:pPr lvl="3"/>
             <a:r>
-              <a:rPr lang="en-US" smtClean="0"/>
+              <a:rPr lang="en-US"/>
               <a:t>Fourth level</a:t>
             </a:r>
           </a:p>
           <a:p>
             <a:pPr lvl="4"/>
             <a:r>
-              <a:rPr lang="en-US" smtClean="0"/>
+              <a:rPr lang="en-US"/>
               <a:t>Fifth level</a:t>
             </a:r>
             <a:endParaRPr lang="en-US" dirty="0"/>
@@ -3486,7 +3487,7 @@
           <a:p>
             <a:pPr lvl="0"/>
             <a:r>
-              <a:rPr lang="en-US" smtClean="0"/>
+              <a:rPr lang="en-US"/>
               <a:t>Edit Master text styles</a:t>
             </a:r>
           </a:p>
@@ -3516,35 +3517,35 @@
           <a:p>
             <a:pPr lvl="0"/>
             <a:r>
-              <a:rPr lang="en-US" smtClean="0"/>
+              <a:rPr lang="en-US"/>
               <a:t>Edit Master text styles</a:t>
             </a:r>
           </a:p>
           <a:p>
             <a:pPr lvl="1"/>
             <a:r>
-              <a:rPr lang="en-US" smtClean="0"/>
+              <a:rPr lang="en-US"/>
               <a:t>Second level</a:t>
             </a:r>
           </a:p>
           <a:p>
             <a:pPr lvl="2"/>
             <a:r>
-              <a:rPr lang="en-US" smtClean="0"/>
+              <a:rPr lang="en-US"/>
               <a:t>Third level</a:t>
             </a:r>
           </a:p>
           <a:p>
             <a:pPr lvl="3"/>
             <a:r>
-              <a:rPr lang="en-US" smtClean="0"/>
+              <a:rPr lang="en-US"/>
               <a:t>Fourth level</a:t>
             </a:r>
           </a:p>
           <a:p>
             <a:pPr lvl="4"/>
             <a:r>
-              <a:rPr lang="en-US" smtClean="0"/>
+              <a:rPr lang="en-US"/>
               <a:t>Fifth level</a:t>
             </a:r>
             <a:endParaRPr lang="en-US" dirty="0"/>
@@ -3569,7 +3570,7 @@
             <a:fld id="{02640F58-564D-2B4F-AE67-E407BA4FCF45}" type="datetimeFigureOut">
               <a:rPr lang="en-US" dirty="0"/>
               <a:pPr/>
-              <a:t>5/17/2019</a:t>
+              <a:t>5/22/2019</a:t>
             </a:fld>
             <a:endParaRPr lang="en-US" dirty="0"/>
           </a:p>
@@ -3612,7 +3613,7 @@
             <a:fld id="{D57F1E4F-1CFF-5643-939E-217C01CDF565}" type="slidenum">
               <a:rPr lang="en-US" dirty="0"/>
               <a:pPr/>
-              <a:t>‹#›</a:t>
+              <a:t>‹N›</a:t>
             </a:fld>
             <a:endParaRPr lang="en-US" dirty="0"/>
           </a:p>
@@ -3720,7 +3721,7 @@
           <a:ln/>
           <a:extLst>
             <a:ext uri="{91240B29-F687-4f45-9708-019B960494DF}">
-              <a14:hiddenLine xmlns="" xmlns:a14="http://schemas.microsoft.com/office/drawing/2010/main" w="9525">
+              <a14:hiddenLine xmlns:a14="http://schemas.microsoft.com/office/drawing/2010/main" xmlns="" w="9525">
                 <a:solidFill>
                   <a:srgbClr val="000000"/>
                 </a:solidFill>
@@ -3762,7 +3763,7 @@
           <a:lstStyle/>
           <a:p>
             <a:r>
-              <a:rPr lang="en-US" smtClean="0"/>
+              <a:rPr lang="en-US"/>
               <a:t>Click to edit Master title style</a:t>
             </a:r>
             <a:endParaRPr lang="en-US" dirty="0"/>
@@ -3787,7 +3788,7 @@
             <a:fld id="{F13A34C8-038E-2045-AF43-DF7DBB8E0E9E}" type="datetimeFigureOut">
               <a:rPr lang="en-US" dirty="0"/>
               <a:pPr/>
-              <a:t>5/17/2019</a:t>
+              <a:t>5/22/2019</a:t>
             </a:fld>
             <a:endParaRPr lang="en-US" dirty="0"/>
           </a:p>
@@ -3830,7 +3831,7 @@
             <a:fld id="{D57F1E4F-1CFF-5643-939E-217C01CDF565}" type="slidenum">
               <a:rPr lang="en-US" dirty="0"/>
               <a:pPr/>
-              <a:t>‹#›</a:t>
+              <a:t>‹N›</a:t>
             </a:fld>
             <a:endParaRPr lang="en-US" dirty="0"/>
           </a:p>
@@ -3879,7 +3880,7 @@
             <a:fld id="{8818C68F-D26B-8F47-958C-23B49CF8A634}" type="datetimeFigureOut">
               <a:rPr lang="en-US" dirty="0"/>
               <a:pPr/>
-              <a:t>5/17/2019</a:t>
+              <a:t>5/22/2019</a:t>
             </a:fld>
             <a:endParaRPr lang="en-US" dirty="0"/>
           </a:p>
@@ -3922,7 +3923,7 @@
             <a:fld id="{D57F1E4F-1CFF-5643-939E-217C01CDF565}" type="slidenum">
               <a:rPr lang="en-US" dirty="0"/>
               <a:pPr/>
-              <a:t>‹#›</a:t>
+              <a:t>‹N›</a:t>
             </a:fld>
             <a:endParaRPr lang="en-US" dirty="0"/>
           </a:p>
@@ -4143,7 +4144,7 @@
           <a:ln/>
           <a:extLst>
             <a:ext uri="{91240B29-F687-4f45-9708-019B960494DF}">
-              <a14:hiddenLine xmlns="" xmlns:a14="http://schemas.microsoft.com/office/drawing/2010/main" w="9525">
+              <a14:hiddenLine xmlns:a14="http://schemas.microsoft.com/office/drawing/2010/main" xmlns="" w="9525">
                 <a:solidFill>
                   <a:srgbClr val="000000"/>
                 </a:solidFill>
@@ -4194,7 +4195,7 @@
           </a:lstStyle>
           <a:p>
             <a:r>
-              <a:rPr lang="en-US" smtClean="0"/>
+              <a:rPr lang="en-US"/>
               <a:t>Click to edit Master title style</a:t>
             </a:r>
             <a:endParaRPr lang="en-US" dirty="0"/>
@@ -4225,35 +4226,35 @@
           <a:p>
             <a:pPr lvl="0"/>
             <a:r>
-              <a:rPr lang="en-US" smtClean="0"/>
+              <a:rPr lang="en-US"/>
               <a:t>Edit Master text styles</a:t>
             </a:r>
           </a:p>
           <a:p>
             <a:pPr lvl="1"/>
             <a:r>
-              <a:rPr lang="en-US" smtClean="0"/>
+              <a:rPr lang="en-US"/>
               <a:t>Second level</a:t>
             </a:r>
           </a:p>
           <a:p>
             <a:pPr lvl="2"/>
             <a:r>
-              <a:rPr lang="en-US" smtClean="0"/>
+              <a:rPr lang="en-US"/>
               <a:t>Third level</a:t>
             </a:r>
           </a:p>
           <a:p>
             <a:pPr lvl="3"/>
             <a:r>
-              <a:rPr lang="en-US" smtClean="0"/>
+              <a:rPr lang="en-US"/>
               <a:t>Fourth level</a:t>
             </a:r>
           </a:p>
           <a:p>
             <a:pPr lvl="4"/>
             <a:r>
-              <a:rPr lang="en-US" smtClean="0"/>
+              <a:rPr lang="en-US"/>
               <a:t>Fifth level</a:t>
             </a:r>
             <a:endParaRPr lang="en-US" dirty="0"/>
@@ -4319,7 +4320,7 @@
           <a:p>
             <a:pPr lvl="0"/>
             <a:r>
-              <a:rPr lang="en-US" smtClean="0"/>
+              <a:rPr lang="en-US"/>
               <a:t>Edit Master text styles</a:t>
             </a:r>
           </a:p>
@@ -4343,7 +4344,7 @@
             <a:fld id="{D0DF5E60-9974-AC48-9591-99C2BB44B7CF}" type="datetimeFigureOut">
               <a:rPr lang="en-US" dirty="0"/>
               <a:pPr/>
-              <a:t>5/17/2019</a:t>
+              <a:t>5/22/2019</a:t>
             </a:fld>
             <a:endParaRPr lang="en-US" dirty="0"/>
           </a:p>
@@ -4386,7 +4387,7 @@
             <a:fld id="{D57F1E4F-1CFF-5643-939E-217C01CDF565}" type="slidenum">
               <a:rPr lang="en-US" dirty="0"/>
               <a:pPr/>
-              <a:t>‹#›</a:t>
+              <a:t>‹N›</a:t>
             </a:fld>
             <a:endParaRPr lang="en-US" dirty="0"/>
           </a:p>
@@ -4444,7 +4445,7 @@
           </a:lstStyle>
           <a:p>
             <a:r>
-              <a:rPr lang="en-US" smtClean="0"/>
+              <a:rPr lang="en-US"/>
               <a:t>Click to edit Master title style</a:t>
             </a:r>
             <a:endParaRPr lang="en-US" dirty="0"/>
@@ -4556,7 +4557,7 @@
           </a:lstStyle>
           <a:p>
             <a:r>
-              <a:rPr lang="en-US" smtClean="0"/>
+              <a:rPr lang="en-US"/>
               <a:t>Click icon to add picture</a:t>
             </a:r>
             <a:endParaRPr lang="en-US" dirty="0"/>
@@ -4624,7 +4625,7 @@
           <a:p>
             <a:pPr lvl="0"/>
             <a:r>
-              <a:rPr lang="en-US" smtClean="0"/>
+              <a:rPr lang="en-US"/>
               <a:t>Edit Master text styles</a:t>
             </a:r>
           </a:p>
@@ -4653,7 +4654,7 @@
             <a:fld id="{18C79C5D-2A6F-F04D-97DA-BEF2467B64E4}" type="datetimeFigureOut">
               <a:rPr lang="en-US" dirty="0"/>
               <a:pPr/>
-              <a:t>5/17/2019</a:t>
+              <a:t>5/22/2019</a:t>
             </a:fld>
             <a:endParaRPr lang="en-US" dirty="0"/>
           </a:p>
@@ -4706,7 +4707,7 @@
             <a:fld id="{D57F1E4F-1CFF-5643-939E-217C01CDF565}" type="slidenum">
               <a:rPr lang="en-US" dirty="0"/>
               <a:pPr/>
-              <a:t>‹#›</a:t>
+              <a:t>‹N›</a:t>
             </a:fld>
             <a:endParaRPr lang="en-US" dirty="0"/>
           </a:p>
@@ -4775,7 +4776,7 @@
           <a:lstStyle/>
           <a:p>
             <a:r>
-              <a:rPr lang="en-US" smtClean="0"/>
+              <a:rPr lang="en-US"/>
               <a:t>Click to edit Master title style</a:t>
             </a:r>
             <a:endParaRPr lang="en-US" dirty="0"/>
@@ -4816,35 +4817,35 @@
           <a:p>
             <a:pPr lvl="0"/>
             <a:r>
-              <a:rPr lang="en-US" smtClean="0"/>
+              <a:rPr lang="en-US"/>
               <a:t>Edit Master text styles</a:t>
             </a:r>
           </a:p>
           <a:p>
             <a:pPr lvl="1"/>
             <a:r>
-              <a:rPr lang="en-US" smtClean="0"/>
+              <a:rPr lang="en-US"/>
               <a:t>Second level</a:t>
             </a:r>
           </a:p>
           <a:p>
             <a:pPr lvl="2"/>
             <a:r>
-              <a:rPr lang="en-US" smtClean="0"/>
+              <a:rPr lang="en-US"/>
               <a:t>Third level</a:t>
             </a:r>
           </a:p>
           <a:p>
             <a:pPr lvl="3"/>
             <a:r>
-              <a:rPr lang="en-US" smtClean="0"/>
+              <a:rPr lang="en-US"/>
               <a:t>Fourth level</a:t>
             </a:r>
           </a:p>
           <a:p>
             <a:pPr lvl="4"/>
             <a:r>
-              <a:rPr lang="en-US" smtClean="0"/>
+              <a:rPr lang="en-US"/>
               <a:t>Fifth level</a:t>
             </a:r>
             <a:endParaRPr lang="en-US" dirty="0"/>
@@ -4920,7 +4921,7 @@
             <a:fld id="{09B482E8-6E0E-1B4F-B1FD-C69DB9E858D9}" type="datetimeFigureOut">
               <a:rPr lang="en-US" dirty="0"/>
               <a:pPr/>
-              <a:t>5/17/2019</a:t>
+              <a:t>5/22/2019</a:t>
             </a:fld>
             <a:endParaRPr lang="en-US" dirty="0"/>
           </a:p>
@@ -4960,7 +4961,7 @@
             <a:fld id="{D57F1E4F-1CFF-5643-939E-217C01CDF565}" type="slidenum">
               <a:rPr lang="en-US" dirty="0"/>
               <a:pPr/>
-              <a:t>‹#›</a:t>
+              <a:t>‹N›</a:t>
             </a:fld>
             <a:endParaRPr lang="en-US" dirty="0"/>
           </a:p>
@@ -5382,10 +5383,9 @@
           <a:lstStyle/>
           <a:p>
             <a:r>
-              <a:rPr lang="it-IT" dirty="0" smtClean="0"/>
+              <a:rPr lang="it-IT" dirty="0"/>
               <a:t>Gestione Casinò</a:t>
             </a:r>
-            <a:endParaRPr lang="it-IT" dirty="0"/>
           </a:p>
         </p:txBody>
       </p:sp>
@@ -5407,18 +5407,9 @@
           <a:lstStyle/>
           <a:p>
             <a:r>
-              <a:rPr lang="it-IT" dirty="0" smtClean="0"/>
-              <a:t>Semplicità ideata da Carlo Pezzotti</a:t>
-            </a:r>
-            <a:r>
-              <a:rPr lang="it-IT" dirty="0" smtClean="0"/>
-              <a:t>, Matteo Forni, Matan Davidi, Mattia </a:t>
-            </a:r>
-            <a:r>
-              <a:rPr lang="it-IT" dirty="0" smtClean="0"/>
-              <a:t>Toscanelli e Thor Dublin</a:t>
-            </a:r>
-            <a:endParaRPr lang="it-IT" dirty="0"/>
+              <a:rPr lang="it-IT" dirty="0"/>
+              <a:t>Semplicità ideata da Carlo Pezzotti, Matteo Forni, Matan Davidi, Mattia Toscanelli e Thor Dublin</a:t>
+            </a:r>
           </a:p>
         </p:txBody>
       </p:sp>
@@ -5432,17 +5423,88 @@
   <p:clrMapOvr>
     <a:masterClrMapping/>
   </p:clrMapOvr>
-  <p:timing>
-    <p:tnLst>
-      <p:par>
-        <p:cTn id="1" dur="indefinite" restart="never" nodeType="tmRoot"/>
-      </p:par>
-    </p:tnLst>
-  </p:timing>
 </p:sld>
 </file>
 
 <file path=ppt/slides/slide10.xml><?xml version="1.0" encoding="utf-8"?>
+<p:sld xmlns:a="http://schemas.openxmlformats.org/drawingml/2006/main" xmlns:r="http://schemas.openxmlformats.org/officeDocument/2006/relationships" xmlns:p="http://schemas.openxmlformats.org/presentationml/2006/main">
+  <p:cSld>
+    <p:spTree>
+      <p:nvGrpSpPr>
+        <p:cNvPr id="1" name=""/>
+        <p:cNvGrpSpPr/>
+        <p:nvPr/>
+      </p:nvGrpSpPr>
+      <p:grpSpPr>
+        <a:xfrm>
+          <a:off x="0" y="0"/>
+          <a:ext cx="0" cy="0"/>
+          <a:chOff x="0" y="0"/>
+          <a:chExt cx="0" cy="0"/>
+        </a:xfrm>
+      </p:grpSpPr>
+      <p:sp>
+        <p:nvSpPr>
+          <p:cNvPr id="2" name="Title 1"/>
+          <p:cNvSpPr>
+            <a:spLocks noGrp="1"/>
+          </p:cNvSpPr>
+          <p:nvPr>
+            <p:ph type="title"/>
+          </p:nvPr>
+        </p:nvSpPr>
+        <p:spPr/>
+        <p:txBody>
+          <a:bodyPr/>
+          <a:lstStyle/>
+          <a:p>
+            <a:r>
+              <a:rPr lang="it-IT" dirty="0"/>
+              <a:t>Frontend</a:t>
+            </a:r>
+          </a:p>
+        </p:txBody>
+      </p:sp>
+      <p:pic>
+        <p:nvPicPr>
+          <p:cNvPr id="4" name="Content Placeholder 3"/>
+          <p:cNvPicPr>
+            <a:picLocks noGrp="1" noChangeAspect="1"/>
+          </p:cNvPicPr>
+          <p:nvPr>
+            <p:ph idx="1"/>
+          </p:nvPr>
+        </p:nvPicPr>
+        <p:blipFill>
+          <a:blip r:embed="rId2"/>
+          <a:stretch>
+            <a:fillRect/>
+          </a:stretch>
+        </p:blipFill>
+        <p:spPr>
+          <a:xfrm>
+            <a:off x="1380700" y="2222500"/>
+            <a:ext cx="9430598" cy="4273550"/>
+          </a:xfrm>
+          <a:prstGeom prst="rect">
+            <a:avLst/>
+          </a:prstGeom>
+        </p:spPr>
+      </p:pic>
+    </p:spTree>
+    <p:extLst>
+      <p:ext uri="{BB962C8B-B14F-4D97-AF65-F5344CB8AC3E}">
+        <p14:creationId xmlns:p14="http://schemas.microsoft.com/office/powerpoint/2010/main" val="583128748"/>
+      </p:ext>
+    </p:extLst>
+  </p:cSld>
+  <p:clrMapOvr>
+    <a:masterClrMapping/>
+  </p:clrMapOvr>
+</p:sld>
+</file>
+
+<file path=ppt/slides/slide11.xml><?xml version="1.0" encoding="utf-8"?>
 <p:sld xmlns:a="http://schemas.openxmlformats.org/drawingml/2006/main" xmlns:r="http://schemas.openxmlformats.org/officeDocument/2006/relationships" xmlns:p="http://schemas.openxmlformats.org/presentationml/2006/main">
   <p:cSld>
     <p:spTree>
@@ -5496,17 +5558,10 @@
   <p:transition spd="slow">
     <p:push dir="u"/>
   </p:transition>
-  <p:timing>
-    <p:tnLst>
-      <p:par>
-        <p:cTn id="1" dur="indefinite" restart="never" nodeType="tmRoot"/>
-      </p:par>
-    </p:tnLst>
-  </p:timing>
 </p:sld>
 </file>
 
-<file path=ppt/slides/slide11.xml><?xml version="1.0" encoding="utf-8"?>
+<file path=ppt/slides/slide12.xml><?xml version="1.0" encoding="utf-8"?>
 <p:sld xmlns:a="http://schemas.openxmlformats.org/drawingml/2006/main" xmlns:r="http://schemas.openxmlformats.org/officeDocument/2006/relationships" xmlns:p="http://schemas.openxmlformats.org/presentationml/2006/main">
   <p:cSld>
     <p:spTree>
@@ -5608,17 +5663,10 @@
   <p:transition spd="slow">
     <p:push dir="u"/>
   </p:transition>
-  <p:timing>
-    <p:tnLst>
-      <p:par>
-        <p:cTn id="1" dur="indefinite" restart="never" nodeType="tmRoot"/>
-      </p:par>
-    </p:tnLst>
-  </p:timing>
 </p:sld>
 </file>
 
-<file path=ppt/slides/slide12.xml><?xml version="1.0" encoding="utf-8"?>
+<file path=ppt/slides/slide13.xml><?xml version="1.0" encoding="utf-8"?>
 <p:sld xmlns:a="http://schemas.openxmlformats.org/drawingml/2006/main" xmlns:r="http://schemas.openxmlformats.org/officeDocument/2006/relationships" xmlns:p="http://schemas.openxmlformats.org/presentationml/2006/main">
   <p:cSld>
     <p:spTree>
@@ -5720,17 +5768,10 @@
   <p:transition spd="slow">
     <p:push dir="u"/>
   </p:transition>
-  <p:timing>
-    <p:tnLst>
-      <p:par>
-        <p:cTn id="1" dur="indefinite" restart="never" nodeType="tmRoot"/>
-      </p:par>
-    </p:tnLst>
-  </p:timing>
 </p:sld>
 </file>
 
-<file path=ppt/slides/slide13.xml><?xml version="1.0" encoding="utf-8"?>
+<file path=ppt/slides/slide14.xml><?xml version="1.0" encoding="utf-8"?>
 <p:sld xmlns:a="http://schemas.openxmlformats.org/drawingml/2006/main" xmlns:r="http://schemas.openxmlformats.org/officeDocument/2006/relationships" xmlns:p="http://schemas.openxmlformats.org/presentationml/2006/main">
   <p:cSld>
     <p:spTree>
@@ -5832,17 +5873,10 @@
   <p:transition spd="slow">
     <p:push dir="u"/>
   </p:transition>
-  <p:timing>
-    <p:tnLst>
-      <p:par>
-        <p:cTn id="1" dur="indefinite" restart="never" nodeType="tmRoot"/>
-      </p:par>
-    </p:tnLst>
-  </p:timing>
 </p:sld>
 </file>
 
-<file path=ppt/slides/slide14.xml><?xml version="1.0" encoding="utf-8"?>
+<file path=ppt/slides/slide15.xml><?xml version="1.0" encoding="utf-8"?>
 <p:sld xmlns:a="http://schemas.openxmlformats.org/drawingml/2006/main" xmlns:r="http://schemas.openxmlformats.org/officeDocument/2006/relationships" xmlns:p="http://schemas.openxmlformats.org/presentationml/2006/main">
   <p:cSld>
     <p:spTree>
@@ -5875,10 +5909,9 @@
           <a:lstStyle/>
           <a:p>
             <a:r>
-              <a:rPr lang="it-IT" dirty="0" smtClean="0"/>
+              <a:rPr lang="it-IT" dirty="0"/>
               <a:t>Backend</a:t>
             </a:r>
-            <a:endParaRPr lang="it-IT" dirty="0"/>
           </a:p>
         </p:txBody>
       </p:sp>
@@ -5900,7 +5933,7 @@
           <a:lstStyle/>
           <a:p>
             <a:r>
-              <a:rPr lang="it-IT" sz="2500" dirty="0" smtClean="0"/>
+              <a:rPr lang="it-IT" sz="2500" dirty="0"/>
               <a:t>Tutto quello che l’utente non vede.</a:t>
             </a:r>
           </a:p>
@@ -5909,7 +5942,7 @@
           </a:p>
           <a:p>
             <a:r>
-              <a:rPr lang="it-IT" sz="2500" dirty="0" smtClean="0"/>
+              <a:rPr lang="it-IT" sz="2500" dirty="0"/>
               <a:t>PHP 7.2</a:t>
             </a:r>
           </a:p>
@@ -5966,17 +5999,10 @@
   <p:clrMapOvr>
     <a:masterClrMapping/>
   </p:clrMapOvr>
-  <p:timing>
-    <p:tnLst>
-      <p:par>
-        <p:cTn id="1" dur="indefinite" restart="never" nodeType="tmRoot"/>
-      </p:par>
-    </p:tnLst>
-  </p:timing>
 </p:sld>
 </file>
 
-<file path=ppt/slides/slide15.xml><?xml version="1.0" encoding="utf-8"?>
+<file path=ppt/slides/slide16.xml><?xml version="1.0" encoding="utf-8"?>
 <p:sld xmlns:a="http://schemas.openxmlformats.org/drawingml/2006/main" xmlns:r="http://schemas.openxmlformats.org/officeDocument/2006/relationships" xmlns:p="http://schemas.openxmlformats.org/presentationml/2006/main">
   <p:cSld>
     <p:spTree>
@@ -6030,17 +6056,10 @@
   <p:transition spd="slow">
     <p:push dir="u"/>
   </p:transition>
-  <p:timing>
-    <p:tnLst>
-      <p:par>
-        <p:cTn id="1" dur="indefinite" restart="never" nodeType="tmRoot"/>
-      </p:par>
-    </p:tnLst>
-  </p:timing>
 </p:sld>
 </file>
 
-<file path=ppt/slides/slide16.xml><?xml version="1.0" encoding="utf-8"?>
+<file path=ppt/slides/slide17.xml><?xml version="1.0" encoding="utf-8"?>
 <p:sld xmlns:a="http://schemas.openxmlformats.org/drawingml/2006/main" xmlns:r="http://schemas.openxmlformats.org/officeDocument/2006/relationships" xmlns:p="http://schemas.openxmlformats.org/presentationml/2006/main">
   <p:cSld>
     <p:spTree>
@@ -6094,96 +6113,6 @@
   <p:transition spd="slow">
     <p:push dir="u"/>
   </p:transition>
-  <p:timing>
-    <p:tnLst>
-      <p:par>
-        <p:cTn id="1" dur="indefinite" restart="never" nodeType="tmRoot"/>
-      </p:par>
-    </p:tnLst>
-  </p:timing>
-</p:sld>
-</file>
-
-<file path=ppt/slides/slide17.xml><?xml version="1.0" encoding="utf-8"?>
-<p:sld xmlns:a="http://schemas.openxmlformats.org/drawingml/2006/main" xmlns:r="http://schemas.openxmlformats.org/officeDocument/2006/relationships" xmlns:p="http://schemas.openxmlformats.org/presentationml/2006/main">
-  <p:cSld>
-    <p:spTree>
-      <p:nvGrpSpPr>
-        <p:cNvPr id="1" name=""/>
-        <p:cNvGrpSpPr/>
-        <p:nvPr/>
-      </p:nvGrpSpPr>
-      <p:grpSpPr>
-        <a:xfrm>
-          <a:off x="0" y="0"/>
-          <a:ext cx="0" cy="0"/>
-          <a:chOff x="0" y="0"/>
-          <a:chExt cx="0" cy="0"/>
-        </a:xfrm>
-      </p:grpSpPr>
-      <p:sp>
-        <p:nvSpPr>
-          <p:cNvPr id="2" name="Title 1"/>
-          <p:cNvSpPr>
-            <a:spLocks noGrp="1"/>
-          </p:cNvSpPr>
-          <p:nvPr>
-            <p:ph type="ctrTitle"/>
-          </p:nvPr>
-        </p:nvSpPr>
-        <p:spPr/>
-        <p:txBody>
-          <a:bodyPr/>
-          <a:lstStyle/>
-          <a:p>
-            <a:r>
-              <a:rPr lang="it-IT" dirty="0" smtClean="0"/>
-              <a:t>Struttura del lavoro di team</a:t>
-            </a:r>
-            <a:endParaRPr lang="it-IT" dirty="0"/>
-          </a:p>
-        </p:txBody>
-      </p:sp>
-      <p:sp>
-        <p:nvSpPr>
-          <p:cNvPr id="3" name="Subtitle 2"/>
-          <p:cNvSpPr>
-            <a:spLocks noGrp="1"/>
-          </p:cNvSpPr>
-          <p:nvPr>
-            <p:ph type="subTitle" idx="1"/>
-          </p:nvPr>
-        </p:nvSpPr>
-        <p:spPr/>
-        <p:txBody>
-          <a:bodyPr/>
-          <a:lstStyle/>
-          <a:p>
-            <a:r>
-              <a:rPr lang="it-IT" dirty="0" smtClean="0"/>
-              <a:t>Jenkins, Selenium, JUnit, PHPUnit</a:t>
-            </a:r>
-            <a:endParaRPr lang="it-IT" dirty="0"/>
-          </a:p>
-        </p:txBody>
-      </p:sp>
-    </p:spTree>
-    <p:extLst>
-      <p:ext uri="{BB962C8B-B14F-4D97-AF65-F5344CB8AC3E}">
-        <p14:creationId xmlns:p14="http://schemas.microsoft.com/office/powerpoint/2010/main" val="2858754388"/>
-      </p:ext>
-    </p:extLst>
-  </p:cSld>
-  <p:clrMapOvr>
-    <a:masterClrMapping/>
-  </p:clrMapOvr>
-  <p:timing>
-    <p:tnLst>
-      <p:par>
-        <p:cTn id="1" dur="indefinite" restart="never" nodeType="tmRoot"/>
-      </p:par>
-    </p:tnLst>
-  </p:timing>
 </p:sld>
 </file>
 
@@ -6211,6 +6140,80 @@
             <a:spLocks noGrp="1"/>
           </p:cNvSpPr>
           <p:nvPr>
+            <p:ph type="ctrTitle"/>
+          </p:nvPr>
+        </p:nvSpPr>
+        <p:spPr/>
+        <p:txBody>
+          <a:bodyPr/>
+          <a:lstStyle/>
+          <a:p>
+            <a:r>
+              <a:rPr lang="it-IT" dirty="0"/>
+              <a:t>Struttura del lavoro di team</a:t>
+            </a:r>
+          </a:p>
+        </p:txBody>
+      </p:sp>
+      <p:sp>
+        <p:nvSpPr>
+          <p:cNvPr id="3" name="Subtitle 2"/>
+          <p:cNvSpPr>
+            <a:spLocks noGrp="1"/>
+          </p:cNvSpPr>
+          <p:nvPr>
+            <p:ph type="subTitle" idx="1"/>
+          </p:nvPr>
+        </p:nvSpPr>
+        <p:spPr/>
+        <p:txBody>
+          <a:bodyPr/>
+          <a:lstStyle/>
+          <a:p>
+            <a:r>
+              <a:rPr lang="it-IT" dirty="0"/>
+              <a:t>Jenkins, Selenium, JUnit, PHPUnit</a:t>
+            </a:r>
+          </a:p>
+        </p:txBody>
+      </p:sp>
+    </p:spTree>
+    <p:extLst>
+      <p:ext uri="{BB962C8B-B14F-4D97-AF65-F5344CB8AC3E}">
+        <p14:creationId xmlns:p14="http://schemas.microsoft.com/office/powerpoint/2010/main" val="2858754388"/>
+      </p:ext>
+    </p:extLst>
+  </p:cSld>
+  <p:clrMapOvr>
+    <a:masterClrMapping/>
+  </p:clrMapOvr>
+</p:sld>
+</file>
+
+<file path=ppt/slides/slide19.xml><?xml version="1.0" encoding="utf-8"?>
+<p:sld xmlns:a="http://schemas.openxmlformats.org/drawingml/2006/main" xmlns:r="http://schemas.openxmlformats.org/officeDocument/2006/relationships" xmlns:p="http://schemas.openxmlformats.org/presentationml/2006/main">
+  <p:cSld>
+    <p:spTree>
+      <p:nvGrpSpPr>
+        <p:cNvPr id="1" name=""/>
+        <p:cNvGrpSpPr/>
+        <p:nvPr/>
+      </p:nvGrpSpPr>
+      <p:grpSpPr>
+        <a:xfrm>
+          <a:off x="0" y="0"/>
+          <a:ext cx="0" cy="0"/>
+          <a:chOff x="0" y="0"/>
+          <a:chExt cx="0" cy="0"/>
+        </a:xfrm>
+      </p:grpSpPr>
+      <p:sp>
+        <p:nvSpPr>
+          <p:cNvPr id="2" name="Title 1"/>
+          <p:cNvSpPr>
+            <a:spLocks noGrp="1"/>
+          </p:cNvSpPr>
+          <p:nvPr>
             <p:ph type="title"/>
           </p:nvPr>
         </p:nvSpPr>
@@ -6220,10 +6223,9 @@
           <a:lstStyle/>
           <a:p>
             <a:r>
-              <a:rPr lang="it-IT" dirty="0" smtClean="0"/>
+              <a:rPr lang="it-IT" dirty="0"/>
               <a:t>Jenkins</a:t>
             </a:r>
-            <a:endParaRPr lang="it-IT" dirty="0"/>
           </a:p>
         </p:txBody>
       </p:sp>
@@ -6245,7 +6247,7 @@
           <a:lstStyle/>
           <a:p>
             <a:r>
-              <a:rPr lang="it-IT" sz="2500" dirty="0" smtClean="0"/>
+              <a:rPr lang="it-IT" sz="2500" dirty="0"/>
               <a:t>Verfica il codice</a:t>
             </a:r>
           </a:p>
@@ -6254,10 +6256,9 @@
           </a:p>
           <a:p>
             <a:r>
-              <a:rPr lang="it-IT" sz="2500" dirty="0" smtClean="0"/>
+              <a:rPr lang="it-IT" sz="2500" dirty="0"/>
               <a:t>Funziona grazie ad eventi</a:t>
             </a:r>
-            <a:endParaRPr lang="it-IT" sz="2500" dirty="0"/>
           </a:p>
         </p:txBody>
       </p:sp>
@@ -6312,17 +6313,10 @@
   <p:clrMapOvr>
     <a:masterClrMapping/>
   </p:clrMapOvr>
-  <p:timing>
-    <p:tnLst>
-      <p:par>
-        <p:cTn id="1" dur="indefinite" restart="never" nodeType="tmRoot"/>
-      </p:par>
-    </p:tnLst>
-  </p:timing>
 </p:sld>
 </file>
 
-<file path=ppt/slides/slide19.xml><?xml version="1.0" encoding="utf-8"?>
+<file path=ppt/slides/slide2.xml><?xml version="1.0" encoding="utf-8"?>
 <p:sld xmlns:a="http://schemas.openxmlformats.org/drawingml/2006/main" xmlns:r="http://schemas.openxmlformats.org/officeDocument/2006/relationships" xmlns:p="http://schemas.openxmlformats.org/presentationml/2006/main">
   <p:cSld>
     <p:spTree>
@@ -6355,111 +6349,20 @@
           <a:lstStyle/>
           <a:p>
             <a:r>
-              <a:rPr lang="it-IT" dirty="0" smtClean="0"/>
-              <a:t>Test PHPUnit</a:t>
-            </a:r>
-            <a:endParaRPr lang="it-IT" dirty="0"/>
-          </a:p>
-        </p:txBody>
-      </p:sp>
-      <p:sp>
-        <p:nvSpPr>
-          <p:cNvPr id="5" name="Content Placeholder 4"/>
+              <a:rPr lang="it-IT" dirty="0"/>
+              <a:t>Chi siamo?</a:t>
+            </a:r>
+          </a:p>
+        </p:txBody>
+      </p:sp>
+      <p:sp>
+        <p:nvSpPr>
+          <p:cNvPr id="3" name="Content Placeholder 2"/>
           <p:cNvSpPr>
             <a:spLocks noGrp="1"/>
           </p:cNvSpPr>
           <p:nvPr>
             <p:ph idx="1"/>
-          </p:nvPr>
-        </p:nvSpPr>
-        <p:spPr/>
-        <p:txBody>
-          <a:bodyPr/>
-          <a:lstStyle/>
-          <a:p>
-            <a:r>
-              <a:rPr lang="it-IT" sz="2200" dirty="0" smtClean="0"/>
-              <a:t>Esempio</a:t>
-            </a:r>
-            <a:r>
-              <a:rPr lang="it-IT" dirty="0" smtClean="0"/>
-              <a:t>:</a:t>
-            </a:r>
-          </a:p>
-          <a:p>
-            <a:pPr lvl="1"/>
-            <a:r>
-              <a:rPr lang="it-IT" dirty="0" smtClean="0"/>
-              <a:t>Verifica che la classe rispetti i requisiti.</a:t>
-            </a:r>
-          </a:p>
-          <a:p>
-            <a:pPr lvl="1"/>
-            <a:endParaRPr lang="it-IT" dirty="0"/>
-          </a:p>
-          <a:p>
-            <a:pPr lvl="1"/>
-            <a:r>
-              <a:rPr lang="it-IT" dirty="0" smtClean="0"/>
-              <a:t>Notifica all’esecutore il risultato.</a:t>
-            </a:r>
-          </a:p>
-          <a:p>
-            <a:pPr lvl="1"/>
-            <a:endParaRPr lang="it-IT" dirty="0"/>
-          </a:p>
-          <a:p>
-            <a:pPr lvl="1"/>
-            <a:endParaRPr lang="it-IT" dirty="0" smtClean="0"/>
-          </a:p>
-          <a:p>
-            <a:pPr lvl="1"/>
-            <a:endParaRPr lang="it-IT" dirty="0"/>
-          </a:p>
-          <a:p>
-            <a:pPr lvl="1"/>
-            <a:endParaRPr lang="it-IT" dirty="0" smtClean="0"/>
-          </a:p>
-          <a:p>
-            <a:pPr lvl="1"/>
-            <a:endParaRPr lang="it-IT" dirty="0" smtClean="0"/>
-          </a:p>
-          <a:p>
-            <a:pPr lvl="1"/>
-            <a:endParaRPr lang="it-IT" dirty="0"/>
-          </a:p>
-          <a:p>
-            <a:pPr marL="457200" lvl="1" indent="0">
-              <a:buNone/>
-            </a:pPr>
-            <a:endParaRPr lang="it-IT" dirty="0"/>
-          </a:p>
-          <a:p>
-            <a:pPr marL="457200" lvl="1" indent="0">
-              <a:buNone/>
-            </a:pPr>
-            <a:endParaRPr lang="it-IT" dirty="0" smtClean="0"/>
-          </a:p>
-          <a:p>
-            <a:pPr marL="457200" lvl="1" indent="0">
-              <a:buNone/>
-            </a:pPr>
-            <a:endParaRPr lang="it-IT" dirty="0" smtClean="0"/>
-          </a:p>
-          <a:p>
-            <a:pPr lvl="1"/>
-            <a:endParaRPr lang="it-IT" dirty="0"/>
-          </a:p>
-        </p:txBody>
-      </p:sp>
-      <p:sp>
-        <p:nvSpPr>
-          <p:cNvPr id="3" name="Content Placeholder 2"/>
-          <p:cNvSpPr>
-            <a:spLocks noGrp="1"/>
-          </p:cNvSpPr>
-          <p:nvPr>
-            <p:ph type="body" sz="half" idx="2"/>
           </p:nvPr>
         </p:nvSpPr>
         <p:spPr/>
@@ -6470,7 +6373,182 @@
           <a:lstStyle/>
           <a:p>
             <a:r>
-              <a:rPr lang="it-IT" sz="2500" dirty="0" smtClean="0"/>
+              <a:rPr lang="it-IT" sz="2500" dirty="0"/>
+              <a:t>Carlo Pezzotti, Matan Davdi, Matteo Forni, Mattia Toscanelli e Thor Dublin</a:t>
+            </a:r>
+          </a:p>
+          <a:p>
+            <a:endParaRPr lang="it-IT" sz="2500" dirty="0"/>
+          </a:p>
+          <a:p>
+            <a:r>
+              <a:rPr lang="it-IT" sz="2500" dirty="0"/>
+              <a:t>Informatici</a:t>
+            </a:r>
+          </a:p>
+        </p:txBody>
+      </p:sp>
+    </p:spTree>
+    <p:extLst>
+      <p:ext uri="{BB962C8B-B14F-4D97-AF65-F5344CB8AC3E}">
+        <p14:creationId xmlns:p14="http://schemas.microsoft.com/office/powerpoint/2010/main" val="937138643"/>
+      </p:ext>
+    </p:extLst>
+  </p:cSld>
+  <p:clrMapOvr>
+    <a:masterClrMapping/>
+  </p:clrMapOvr>
+</p:sld>
+</file>
+
+<file path=ppt/slides/slide20.xml><?xml version="1.0" encoding="utf-8"?>
+<p:sld xmlns:a="http://schemas.openxmlformats.org/drawingml/2006/main" xmlns:r="http://schemas.openxmlformats.org/officeDocument/2006/relationships" xmlns:p="http://schemas.openxmlformats.org/presentationml/2006/main">
+  <p:cSld>
+    <p:spTree>
+      <p:nvGrpSpPr>
+        <p:cNvPr id="1" name=""/>
+        <p:cNvGrpSpPr/>
+        <p:nvPr/>
+      </p:nvGrpSpPr>
+      <p:grpSpPr>
+        <a:xfrm>
+          <a:off x="0" y="0"/>
+          <a:ext cx="0" cy="0"/>
+          <a:chOff x="0" y="0"/>
+          <a:chExt cx="0" cy="0"/>
+        </a:xfrm>
+      </p:grpSpPr>
+      <p:sp>
+        <p:nvSpPr>
+          <p:cNvPr id="2" name="Title 1"/>
+          <p:cNvSpPr>
+            <a:spLocks noGrp="1"/>
+          </p:cNvSpPr>
+          <p:nvPr>
+            <p:ph type="title"/>
+          </p:nvPr>
+        </p:nvSpPr>
+        <p:spPr/>
+        <p:txBody>
+          <a:bodyPr/>
+          <a:lstStyle/>
+          <a:p>
+            <a:r>
+              <a:rPr lang="it-IT" dirty="0"/>
+              <a:t>Test PHPUnit</a:t>
+            </a:r>
+          </a:p>
+        </p:txBody>
+      </p:sp>
+      <p:sp>
+        <p:nvSpPr>
+          <p:cNvPr id="5" name="Content Placeholder 4"/>
+          <p:cNvSpPr>
+            <a:spLocks noGrp="1"/>
+          </p:cNvSpPr>
+          <p:nvPr>
+            <p:ph idx="1"/>
+          </p:nvPr>
+        </p:nvSpPr>
+        <p:spPr/>
+        <p:txBody>
+          <a:bodyPr/>
+          <a:lstStyle/>
+          <a:p>
+            <a:r>
+              <a:rPr lang="it-IT" sz="2200" dirty="0"/>
+              <a:t>Esempio</a:t>
+            </a:r>
+            <a:r>
+              <a:rPr lang="it-IT" dirty="0"/>
+              <a:t>:</a:t>
+            </a:r>
+          </a:p>
+          <a:p>
+            <a:pPr lvl="1"/>
+            <a:r>
+              <a:rPr lang="it-IT" dirty="0"/>
+              <a:t>Verifica che la classe rispetti i requisiti.</a:t>
+            </a:r>
+          </a:p>
+          <a:p>
+            <a:pPr lvl="1"/>
+            <a:endParaRPr lang="it-IT" dirty="0"/>
+          </a:p>
+          <a:p>
+            <a:pPr lvl="1"/>
+            <a:r>
+              <a:rPr lang="it-IT" dirty="0"/>
+              <a:t>Notifica all’esecutore il risultato.</a:t>
+            </a:r>
+          </a:p>
+          <a:p>
+            <a:pPr lvl="1"/>
+            <a:endParaRPr lang="it-IT" dirty="0"/>
+          </a:p>
+          <a:p>
+            <a:pPr lvl="1"/>
+            <a:endParaRPr lang="it-IT" dirty="0"/>
+          </a:p>
+          <a:p>
+            <a:pPr lvl="1"/>
+            <a:endParaRPr lang="it-IT" dirty="0"/>
+          </a:p>
+          <a:p>
+            <a:pPr lvl="1"/>
+            <a:endParaRPr lang="it-IT" dirty="0"/>
+          </a:p>
+          <a:p>
+            <a:pPr lvl="1"/>
+            <a:endParaRPr lang="it-IT" dirty="0"/>
+          </a:p>
+          <a:p>
+            <a:pPr lvl="1"/>
+            <a:endParaRPr lang="it-IT" dirty="0"/>
+          </a:p>
+          <a:p>
+            <a:pPr marL="457200" lvl="1" indent="0">
+              <a:buNone/>
+            </a:pPr>
+            <a:endParaRPr lang="it-IT" dirty="0"/>
+          </a:p>
+          <a:p>
+            <a:pPr marL="457200" lvl="1" indent="0">
+              <a:buNone/>
+            </a:pPr>
+            <a:endParaRPr lang="it-IT" dirty="0"/>
+          </a:p>
+          <a:p>
+            <a:pPr marL="457200" lvl="1" indent="0">
+              <a:buNone/>
+            </a:pPr>
+            <a:endParaRPr lang="it-IT" dirty="0"/>
+          </a:p>
+          <a:p>
+            <a:pPr lvl="1"/>
+            <a:endParaRPr lang="it-IT" dirty="0"/>
+          </a:p>
+        </p:txBody>
+      </p:sp>
+      <p:sp>
+        <p:nvSpPr>
+          <p:cNvPr id="3" name="Content Placeholder 2"/>
+          <p:cNvSpPr>
+            <a:spLocks noGrp="1"/>
+          </p:cNvSpPr>
+          <p:nvPr>
+            <p:ph type="body" sz="half" idx="2"/>
+          </p:nvPr>
+        </p:nvSpPr>
+        <p:spPr/>
+        <p:txBody>
+          <a:bodyPr>
+            <a:normAutofit/>
+          </a:bodyPr>
+          <a:lstStyle/>
+          <a:p>
+            <a:r>
+              <a:rPr lang="it-IT" sz="2500" dirty="0"/>
               <a:t>Verifica il funzionamento del codice sorgente</a:t>
             </a:r>
           </a:p>
@@ -6513,17 +6591,10 @@
   <p:transition spd="slow">
     <p:push dir="u"/>
   </p:transition>
-  <p:timing>
-    <p:tnLst>
-      <p:par>
-        <p:cTn id="1" dur="indefinite" restart="never" nodeType="tmRoot"/>
-      </p:par>
-    </p:tnLst>
-  </p:timing>
 </p:sld>
 </file>
 
-<file path=ppt/slides/slide2.xml><?xml version="1.0" encoding="utf-8"?>
+<file path=ppt/slides/slide21.xml><?xml version="1.0" encoding="utf-8"?>
 <p:sld xmlns:a="http://schemas.openxmlformats.org/drawingml/2006/main" xmlns:r="http://schemas.openxmlformats.org/officeDocument/2006/relationships" xmlns:p="http://schemas.openxmlformats.org/presentationml/2006/main">
   <p:cSld>
     <p:spTree>
@@ -6556,11 +6627,107 @@
           <a:lstStyle/>
           <a:p>
             <a:r>
-              <a:rPr lang="it-IT" dirty="0" smtClean="0"/>
-              <a:t>Chi siamo?</a:t>
-            </a:r>
+              <a:rPr lang="it-IT" dirty="0"/>
+              <a:t>Test Selenium</a:t>
+            </a:r>
+          </a:p>
+        </p:txBody>
+      </p:sp>
+      <p:sp>
+        <p:nvSpPr>
+          <p:cNvPr id="5" name="Content Placeholder 4"/>
+          <p:cNvSpPr>
+            <a:spLocks noGrp="1"/>
+          </p:cNvSpPr>
+          <p:nvPr>
+            <p:ph idx="1"/>
+          </p:nvPr>
+        </p:nvSpPr>
+        <p:spPr/>
+        <p:txBody>
+          <a:bodyPr/>
+          <a:lstStyle/>
+          <a:p>
+            <a:endParaRPr lang="it-IT" sz="2200" dirty="0"/>
+          </a:p>
+          <a:p>
+            <a:r>
+              <a:rPr lang="it-IT" sz="2200" dirty="0"/>
+              <a:t>Esempio</a:t>
+            </a:r>
+            <a:r>
+              <a:rPr lang="it-IT" dirty="0"/>
+              <a:t>:</a:t>
+            </a:r>
+          </a:p>
+          <a:p>
+            <a:pPr lvl="1"/>
+            <a:r>
+              <a:rPr lang="it-IT" dirty="0"/>
+              <a:t>Verifica che la pagina rispetti i requisiti.</a:t>
+            </a:r>
+          </a:p>
+          <a:p>
+            <a:pPr lvl="1"/>
             <a:endParaRPr lang="it-IT" dirty="0"/>
           </a:p>
+          <a:p>
+            <a:pPr lvl="1"/>
+            <a:r>
+              <a:rPr lang="it-IT" dirty="0"/>
+              <a:t>Notifica all’esecutore il risultato.</a:t>
+            </a:r>
+          </a:p>
+          <a:p>
+            <a:pPr lvl="1"/>
+            <a:endParaRPr lang="it-IT" dirty="0"/>
+          </a:p>
+          <a:p>
+            <a:pPr lvl="1"/>
+            <a:endParaRPr lang="it-IT" dirty="0"/>
+          </a:p>
+          <a:p>
+            <a:pPr lvl="1"/>
+            <a:endParaRPr lang="it-IT" dirty="0"/>
+          </a:p>
+          <a:p>
+            <a:pPr lvl="1"/>
+            <a:endParaRPr lang="it-IT" dirty="0"/>
+          </a:p>
+          <a:p>
+            <a:pPr lvl="1"/>
+            <a:endParaRPr lang="it-IT" dirty="0"/>
+          </a:p>
+          <a:p>
+            <a:pPr lvl="1"/>
+            <a:endParaRPr lang="it-IT" dirty="0"/>
+          </a:p>
+          <a:p>
+            <a:pPr lvl="1"/>
+            <a:endParaRPr lang="it-IT" dirty="0"/>
+          </a:p>
+          <a:p>
+            <a:pPr marL="457200" lvl="1" indent="0">
+              <a:buNone/>
+            </a:pPr>
+            <a:endParaRPr lang="it-IT" dirty="0"/>
+          </a:p>
+          <a:p>
+            <a:pPr marL="457200" lvl="1" indent="0">
+              <a:buNone/>
+            </a:pPr>
+            <a:endParaRPr lang="it-IT" dirty="0"/>
+          </a:p>
+          <a:p>
+            <a:pPr marL="457200" lvl="1" indent="0">
+              <a:buNone/>
+            </a:pPr>
+            <a:endParaRPr lang="it-IT" dirty="0"/>
+          </a:p>
+          <a:p>
+            <a:pPr lvl="1"/>
+            <a:endParaRPr lang="it-IT" dirty="0"/>
+          </a:p>
         </p:txBody>
       </p:sp>
       <p:sp>
@@ -6570,7 +6737,7 @@
             <a:spLocks noGrp="1"/>
           </p:cNvSpPr>
           <p:nvPr>
-            <p:ph idx="1"/>
+            <p:ph type="body" sz="half" idx="2"/>
           </p:nvPr>
         </p:nvSpPr>
         <p:spPr/>
@@ -6581,197 +6748,7 @@
           <a:lstStyle/>
           <a:p>
             <a:r>
-              <a:rPr lang="it-IT" sz="2500" dirty="0" smtClean="0"/>
-              <a:t>Carlo Pezzotti, Matan Davdi, Matteo Forni, Mattia Toscanelli e Thor Dublin</a:t>
-            </a:r>
-          </a:p>
-          <a:p>
-            <a:endParaRPr lang="it-IT" sz="2500" dirty="0" smtClean="0"/>
-          </a:p>
-          <a:p>
-            <a:r>
-              <a:rPr lang="it-IT" sz="2500" dirty="0" smtClean="0"/>
-              <a:t>Informatici</a:t>
-            </a:r>
-          </a:p>
-        </p:txBody>
-      </p:sp>
-    </p:spTree>
-    <p:extLst>
-      <p:ext uri="{BB962C8B-B14F-4D97-AF65-F5344CB8AC3E}">
-        <p14:creationId xmlns:p14="http://schemas.microsoft.com/office/powerpoint/2010/main" val="937138643"/>
-      </p:ext>
-    </p:extLst>
-  </p:cSld>
-  <p:clrMapOvr>
-    <a:masterClrMapping/>
-  </p:clrMapOvr>
-  <p:timing>
-    <p:tnLst>
-      <p:par>
-        <p:cTn id="1" dur="indefinite" restart="never" nodeType="tmRoot"/>
-      </p:par>
-    </p:tnLst>
-  </p:timing>
-</p:sld>
-</file>
-
-<file path=ppt/slides/slide20.xml><?xml version="1.0" encoding="utf-8"?>
-<p:sld xmlns:a="http://schemas.openxmlformats.org/drawingml/2006/main" xmlns:r="http://schemas.openxmlformats.org/officeDocument/2006/relationships" xmlns:p="http://schemas.openxmlformats.org/presentationml/2006/main">
-  <p:cSld>
-    <p:spTree>
-      <p:nvGrpSpPr>
-        <p:cNvPr id="1" name=""/>
-        <p:cNvGrpSpPr/>
-        <p:nvPr/>
-      </p:nvGrpSpPr>
-      <p:grpSpPr>
-        <a:xfrm>
-          <a:off x="0" y="0"/>
-          <a:ext cx="0" cy="0"/>
-          <a:chOff x="0" y="0"/>
-          <a:chExt cx="0" cy="0"/>
-        </a:xfrm>
-      </p:grpSpPr>
-      <p:sp>
-        <p:nvSpPr>
-          <p:cNvPr id="2" name="Title 1"/>
-          <p:cNvSpPr>
-            <a:spLocks noGrp="1"/>
-          </p:cNvSpPr>
-          <p:nvPr>
-            <p:ph type="title"/>
-          </p:nvPr>
-        </p:nvSpPr>
-        <p:spPr/>
-        <p:txBody>
-          <a:bodyPr/>
-          <a:lstStyle/>
-          <a:p>
-            <a:r>
-              <a:rPr lang="it-IT" dirty="0" smtClean="0"/>
-              <a:t>Test Selenium</a:t>
-            </a:r>
-            <a:endParaRPr lang="it-IT" dirty="0"/>
-          </a:p>
-        </p:txBody>
-      </p:sp>
-      <p:sp>
-        <p:nvSpPr>
-          <p:cNvPr id="5" name="Content Placeholder 4"/>
-          <p:cNvSpPr>
-            <a:spLocks noGrp="1"/>
-          </p:cNvSpPr>
-          <p:nvPr>
-            <p:ph idx="1"/>
-          </p:nvPr>
-        </p:nvSpPr>
-        <p:spPr/>
-        <p:txBody>
-          <a:bodyPr/>
-          <a:lstStyle/>
-          <a:p>
-            <a:endParaRPr lang="it-IT" sz="2200" dirty="0" smtClean="0"/>
-          </a:p>
-          <a:p>
-            <a:r>
-              <a:rPr lang="it-IT" sz="2200" dirty="0" smtClean="0"/>
-              <a:t>Esempio</a:t>
-            </a:r>
-            <a:r>
-              <a:rPr lang="it-IT" dirty="0" smtClean="0"/>
-              <a:t>:</a:t>
-            </a:r>
-          </a:p>
-          <a:p>
-            <a:pPr lvl="1"/>
-            <a:r>
-              <a:rPr lang="it-IT" dirty="0" smtClean="0"/>
-              <a:t>Verifica che la pagina rispetti i requisiti.</a:t>
-            </a:r>
-          </a:p>
-          <a:p>
-            <a:pPr lvl="1"/>
-            <a:endParaRPr lang="it-IT" dirty="0"/>
-          </a:p>
-          <a:p>
-            <a:pPr lvl="1"/>
-            <a:r>
-              <a:rPr lang="it-IT" dirty="0" smtClean="0"/>
-              <a:t>Notifica all’esecutore il risultato.</a:t>
-            </a:r>
-          </a:p>
-          <a:p>
-            <a:pPr lvl="1"/>
-            <a:endParaRPr lang="it-IT" dirty="0"/>
-          </a:p>
-          <a:p>
-            <a:pPr lvl="1"/>
-            <a:endParaRPr lang="it-IT" dirty="0" smtClean="0"/>
-          </a:p>
-          <a:p>
-            <a:pPr lvl="1"/>
-            <a:endParaRPr lang="it-IT" dirty="0"/>
-          </a:p>
-          <a:p>
-            <a:pPr lvl="1"/>
-            <a:endParaRPr lang="it-IT" dirty="0" smtClean="0"/>
-          </a:p>
-          <a:p>
-            <a:pPr lvl="1"/>
-            <a:endParaRPr lang="it-IT" dirty="0"/>
-          </a:p>
-          <a:p>
-            <a:pPr lvl="1"/>
-            <a:endParaRPr lang="it-IT" dirty="0" smtClean="0"/>
-          </a:p>
-          <a:p>
-            <a:pPr lvl="1"/>
-            <a:endParaRPr lang="it-IT" dirty="0"/>
-          </a:p>
-          <a:p>
-            <a:pPr marL="457200" lvl="1" indent="0">
-              <a:buNone/>
-            </a:pPr>
-            <a:endParaRPr lang="it-IT" dirty="0"/>
-          </a:p>
-          <a:p>
-            <a:pPr marL="457200" lvl="1" indent="0">
-              <a:buNone/>
-            </a:pPr>
-            <a:endParaRPr lang="it-IT" dirty="0" smtClean="0"/>
-          </a:p>
-          <a:p>
-            <a:pPr marL="457200" lvl="1" indent="0">
-              <a:buNone/>
-            </a:pPr>
-            <a:endParaRPr lang="it-IT" dirty="0" smtClean="0"/>
-          </a:p>
-          <a:p>
-            <a:pPr lvl="1"/>
-            <a:endParaRPr lang="it-IT" dirty="0"/>
-          </a:p>
-        </p:txBody>
-      </p:sp>
-      <p:sp>
-        <p:nvSpPr>
-          <p:cNvPr id="3" name="Content Placeholder 2"/>
-          <p:cNvSpPr>
-            <a:spLocks noGrp="1"/>
-          </p:cNvSpPr>
-          <p:nvPr>
-            <p:ph type="body" sz="half" idx="2"/>
-          </p:nvPr>
-        </p:nvSpPr>
-        <p:spPr/>
-        <p:txBody>
-          <a:bodyPr>
-            <a:normAutofit/>
-          </a:bodyPr>
-          <a:lstStyle/>
-          <a:p>
-            <a:r>
-              <a:rPr lang="it-IT" sz="2500" dirty="0" smtClean="0"/>
+              <a:rPr lang="it-IT" sz="2500" dirty="0"/>
               <a:t>Verifica che le pagine siano corrette</a:t>
             </a:r>
           </a:p>
@@ -6780,7 +6757,7 @@
           </a:p>
           <a:p>
             <a:r>
-              <a:rPr lang="it-IT" sz="2500" dirty="0" smtClean="0"/>
+              <a:rPr lang="it-IT" sz="2500" dirty="0"/>
               <a:t>Utilizza JUnit</a:t>
             </a:r>
           </a:p>
@@ -6823,17 +6800,10 @@
   <p:transition spd="slow">
     <p:push dir="u"/>
   </p:transition>
-  <p:timing>
-    <p:tnLst>
-      <p:par>
-        <p:cTn id="1" dur="indefinite" restart="never" nodeType="tmRoot"/>
-      </p:par>
-    </p:tnLst>
-  </p:timing>
 </p:sld>
 </file>
 
-<file path=ppt/slides/slide21.xml><?xml version="1.0" encoding="utf-8"?>
+<file path=ppt/slides/slide22.xml><?xml version="1.0" encoding="utf-8"?>
 <p:sld xmlns:a="http://schemas.openxmlformats.org/drawingml/2006/main" xmlns:r="http://schemas.openxmlformats.org/officeDocument/2006/relationships" xmlns:p="http://schemas.openxmlformats.org/presentationml/2006/main">
   <p:cSld>
     <p:spTree>
@@ -6866,10 +6836,9 @@
           <a:lstStyle/>
           <a:p>
             <a:r>
-              <a:rPr lang="it-IT" dirty="0" smtClean="0"/>
+              <a:rPr lang="it-IT" dirty="0"/>
               <a:t>A cosa serve usare questo approccio?</a:t>
             </a:r>
-            <a:endParaRPr lang="it-IT" dirty="0"/>
           </a:p>
         </p:txBody>
       </p:sp>
@@ -6891,7 +6860,7 @@
           <a:lstStyle/>
           <a:p>
             <a:r>
-              <a:rPr lang="it-IT" sz="2500" dirty="0" smtClean="0"/>
+              <a:rPr lang="it-IT" sz="2500" dirty="0"/>
               <a:t>Professionalmente utile.</a:t>
             </a:r>
           </a:p>
@@ -6900,10 +6869,9 @@
           </a:p>
           <a:p>
             <a:r>
-              <a:rPr lang="it-IT" sz="2500" dirty="0" smtClean="0"/>
+              <a:rPr lang="it-IT" sz="2500" dirty="0"/>
               <a:t>Repository Github sempre corretti.</a:t>
             </a:r>
-            <a:endParaRPr lang="it-IT" sz="2500" dirty="0"/>
           </a:p>
         </p:txBody>
       </p:sp>
@@ -6958,17 +6926,10 @@
   <p:clrMapOvr>
     <a:masterClrMapping/>
   </p:clrMapOvr>
-  <p:timing>
-    <p:tnLst>
-      <p:par>
-        <p:cTn id="1" dur="indefinite" restart="never" nodeType="tmRoot"/>
-      </p:par>
-    </p:tnLst>
-  </p:timing>
 </p:sld>
 </file>
 
-<file path=ppt/slides/slide22.xml><?xml version="1.0" encoding="utf-8"?>
+<file path=ppt/slides/slide23.xml><?xml version="1.0" encoding="utf-8"?>
 <p:sld xmlns:a="http://schemas.openxmlformats.org/drawingml/2006/main" xmlns:r="http://schemas.openxmlformats.org/officeDocument/2006/relationships" xmlns:p="http://schemas.openxmlformats.org/presentationml/2006/main">
   <p:cSld>
     <p:spTree>
@@ -7036,13 +6997,6 @@
   <p:clrMapOvr>
     <a:masterClrMapping/>
   </p:clrMapOvr>
-  <p:timing>
-    <p:tnLst>
-      <p:par>
-        <p:cTn id="1" dur="indefinite" restart="never" nodeType="tmRoot"/>
-      </p:par>
-    </p:tnLst>
-  </p:timing>
 </p:sld>
 </file>
 
@@ -7079,10 +7033,9 @@
           <a:lstStyle/>
           <a:p>
             <a:r>
-              <a:rPr lang="it-IT" dirty="0" smtClean="0"/>
+              <a:rPr lang="it-IT" dirty="0"/>
               <a:t>Progettazione</a:t>
             </a:r>
-            <a:endParaRPr lang="it-IT" dirty="0"/>
           </a:p>
         </p:txBody>
       </p:sp>
@@ -7139,21 +7092,6 @@
   <p:clrMapOvr>
     <a:masterClrMapping/>
   </p:clrMapOvr>
-  <mc:AlternateContent xmlns:mc="http://schemas.openxmlformats.org/markup-compatibility/2006" xmlns:p14="http://schemas.microsoft.com/office/powerpoint/2010/main">
-    <mc:Choice Requires="p14">
-      <p:transition spd="slow" p14:dur="2000"/>
-    </mc:Choice>
-    <mc:Fallback xmlns="">
-      <p:transition spd="slow"/>
-    </mc:Fallback>
-  </mc:AlternateContent>
-  <p:timing>
-    <p:tnLst>
-      <p:par>
-        <p:cTn id="1" dur="indefinite" restart="never" nodeType="tmRoot"/>
-      </p:par>
-    </p:tnLst>
-  </p:timing>
 </p:sld>
 </file>
 
@@ -7190,8 +7128,8 @@
         </p:blipFill>
         <p:spPr>
           <a:xfrm>
-            <a:off x="812800" y="1"/>
-            <a:ext cx="10634133" cy="3200400"/>
+            <a:off x="812801" y="1"/>
+            <a:ext cx="10555200" cy="3176645"/>
           </a:xfrm>
           <a:prstGeom prst="rect">
             <a:avLst/>
@@ -7211,13 +7149,6 @@
   <p:transition spd="slow">
     <p:push dir="u"/>
   </p:transition>
-  <p:timing>
-    <p:tnLst>
-      <p:par>
-        <p:cTn id="1" dur="indefinite" restart="never" nodeType="tmRoot"/>
-      </p:par>
-    </p:tnLst>
-  </p:timing>
 </p:sld>
 </file>
 
@@ -7240,6 +7171,151 @@
       </p:grpSpPr>
       <p:sp>
         <p:nvSpPr>
+          <p:cNvPr id="2" name="Titolo 1">
+            <a:extLst>
+              <a:ext uri="{FF2B5EF4-FFF2-40B4-BE49-F238E27FC236}">
+                <a16:creationId xmlns:a16="http://schemas.microsoft.com/office/drawing/2014/main" id="{09A43FAD-1819-4DB9-B1BD-8DB3596A3092}"/>
+              </a:ext>
+            </a:extLst>
+          </p:cNvPr>
+          <p:cNvSpPr>
+            <a:spLocks noGrp="1"/>
+          </p:cNvSpPr>
+          <p:nvPr>
+            <p:ph type="title"/>
+          </p:nvPr>
+        </p:nvSpPr>
+        <p:spPr/>
+        <p:txBody>
+          <a:bodyPr/>
+          <a:lstStyle/>
+          <a:p>
+            <a:r>
+              <a:rPr lang="it-CH" dirty="0"/>
+              <a:t>Consuntivo</a:t>
+            </a:r>
+          </a:p>
+        </p:txBody>
+      </p:sp>
+      <p:sp>
+        <p:nvSpPr>
+          <p:cNvPr id="3" name="Segnaposto contenuto 2">
+            <a:extLst>
+              <a:ext uri="{FF2B5EF4-FFF2-40B4-BE49-F238E27FC236}">
+                <a16:creationId xmlns:a16="http://schemas.microsoft.com/office/drawing/2014/main" id="{2F6B67BA-86B0-4A3F-8A13-0C8163853BDD}"/>
+              </a:ext>
+            </a:extLst>
+          </p:cNvPr>
+          <p:cNvSpPr>
+            <a:spLocks noGrp="1"/>
+          </p:cNvSpPr>
+          <p:nvPr>
+            <p:ph sz="half" idx="1"/>
+          </p:nvPr>
+        </p:nvSpPr>
+        <p:spPr>
+          <a:xfrm>
+            <a:off x="810000" y="2222288"/>
+            <a:ext cx="10571998" cy="3638763"/>
+          </a:xfrm>
+        </p:spPr>
+        <p:txBody>
+          <a:bodyPr>
+            <a:normAutofit fontScale="92500" lnSpcReduction="20000"/>
+          </a:bodyPr>
+          <a:lstStyle/>
+          <a:p>
+            <a:r>
+              <a:rPr lang="it-CH" sz="3600" dirty="0"/>
+              <a:t>Ritardi:</a:t>
+            </a:r>
+          </a:p>
+          <a:p>
+            <a:pPr lvl="1"/>
+            <a:r>
+              <a:rPr lang="it-CH" sz="3200" dirty="0"/>
+              <a:t>Installazione + configurazione </a:t>
+            </a:r>
+            <a:r>
+              <a:rPr lang="it-CH" sz="3200" dirty="0" err="1"/>
+              <a:t>Selenium</a:t>
+            </a:r>
+            <a:endParaRPr lang="it-CH" sz="3200" dirty="0"/>
+          </a:p>
+          <a:p>
+            <a:pPr lvl="1"/>
+            <a:r>
+              <a:rPr lang="it-CH" sz="3200" dirty="0"/>
+              <a:t>Realizzazione test front-end</a:t>
+            </a:r>
+          </a:p>
+          <a:p>
+            <a:pPr lvl="1"/>
+            <a:r>
+              <a:rPr lang="it-CH" sz="3200" dirty="0"/>
+              <a:t>Analisi software utilizzati:</a:t>
+            </a:r>
+          </a:p>
+          <a:p>
+            <a:pPr lvl="2"/>
+            <a:r>
+              <a:rPr lang="it-CH" sz="2800" dirty="0"/>
+              <a:t>Jenkins</a:t>
+            </a:r>
+          </a:p>
+          <a:p>
+            <a:pPr lvl="2"/>
+            <a:r>
+              <a:rPr lang="it-CH" sz="2800" dirty="0" err="1"/>
+              <a:t>Selenium</a:t>
+            </a:r>
+            <a:endParaRPr lang="it-CH" sz="2800" dirty="0"/>
+          </a:p>
+          <a:p>
+            <a:pPr lvl="2"/>
+            <a:r>
+              <a:rPr lang="it-CH" sz="2800" dirty="0" err="1"/>
+              <a:t>JUnit</a:t>
+            </a:r>
+            <a:endParaRPr lang="it-CH" sz="2800" dirty="0"/>
+          </a:p>
+          <a:p>
+            <a:endParaRPr lang="it-CH" dirty="0"/>
+          </a:p>
+        </p:txBody>
+      </p:sp>
+    </p:spTree>
+    <p:extLst>
+      <p:ext uri="{BB962C8B-B14F-4D97-AF65-F5344CB8AC3E}">
+        <p14:creationId xmlns:p14="http://schemas.microsoft.com/office/powerpoint/2010/main" val="2758030991"/>
+      </p:ext>
+    </p:extLst>
+  </p:cSld>
+  <p:clrMapOvr>
+    <a:masterClrMapping/>
+  </p:clrMapOvr>
+</p:sld>
+</file>
+
+<file path=ppt/slides/slide6.xml><?xml version="1.0" encoding="utf-8"?>
+<p:sld xmlns:a="http://schemas.openxmlformats.org/drawingml/2006/main" xmlns:r="http://schemas.openxmlformats.org/officeDocument/2006/relationships" xmlns:p="http://schemas.openxmlformats.org/presentationml/2006/main">
+  <p:cSld>
+    <p:spTree>
+      <p:nvGrpSpPr>
+        <p:cNvPr id="1" name=""/>
+        <p:cNvGrpSpPr/>
+        <p:nvPr/>
+      </p:nvGrpSpPr>
+      <p:grpSpPr>
+        <a:xfrm>
+          <a:off x="0" y="0"/>
+          <a:ext cx="0" cy="0"/>
+          <a:chOff x="0" y="0"/>
+          <a:chExt cx="0" cy="0"/>
+        </a:xfrm>
+      </p:grpSpPr>
+      <p:sp>
+        <p:nvSpPr>
           <p:cNvPr id="2" name="Title 1"/>
           <p:cNvSpPr>
             <a:spLocks noGrp="1"/>
@@ -7254,10 +7330,9 @@
           <a:lstStyle/>
           <a:p>
             <a:r>
-              <a:rPr lang="it-IT" dirty="0" smtClean="0"/>
+              <a:rPr lang="it-IT" dirty="0"/>
               <a:t>Facile</a:t>
             </a:r>
-            <a:endParaRPr lang="it-IT" dirty="0"/>
           </a:p>
         </p:txBody>
       </p:sp>
@@ -7279,7 +7354,7 @@
           <a:lstStyle/>
           <a:p>
             <a:r>
-              <a:rPr lang="it-IT" sz="2500" dirty="0" smtClean="0"/>
+              <a:rPr lang="it-IT" sz="2500" dirty="0"/>
               <a:t>Interfaccie molto semplici</a:t>
             </a:r>
           </a:p>
@@ -7288,10 +7363,9 @@
           </a:p>
           <a:p>
             <a:r>
-              <a:rPr lang="it-IT" sz="2500" dirty="0" smtClean="0"/>
+              <a:rPr lang="it-IT" sz="2500" dirty="0"/>
               <a:t>Facile da utilizzare (granpa confirmed!)</a:t>
             </a:r>
-            <a:endParaRPr lang="it-IT" sz="2500" dirty="0"/>
           </a:p>
         </p:txBody>
       </p:sp>
@@ -7335,17 +7409,10 @@
   <p:clrMapOvr>
     <a:masterClrMapping/>
   </p:clrMapOvr>
-  <p:timing>
-    <p:tnLst>
-      <p:par>
-        <p:cTn id="1" dur="indefinite" restart="never" nodeType="tmRoot"/>
-      </p:par>
-    </p:tnLst>
-  </p:timing>
 </p:sld>
 </file>
 
-<file path=ppt/slides/slide6.xml><?xml version="1.0" encoding="utf-8"?>
+<file path=ppt/slides/slide7.xml><?xml version="1.0" encoding="utf-8"?>
 <p:sld xmlns:a="http://schemas.openxmlformats.org/drawingml/2006/main" xmlns:r="http://schemas.openxmlformats.org/officeDocument/2006/relationships" xmlns:p="http://schemas.openxmlformats.org/presentationml/2006/main">
   <p:cSld>
     <p:spTree>
@@ -7378,10 +7445,9 @@
           <a:lstStyle/>
           <a:p>
             <a:r>
-              <a:rPr lang="it-IT" dirty="0" smtClean="0"/>
+              <a:rPr lang="it-IT" dirty="0"/>
               <a:t>A cosa serve?</a:t>
             </a:r>
-            <a:endParaRPr lang="it-IT" dirty="0"/>
           </a:p>
         </p:txBody>
       </p:sp>
@@ -7403,7 +7469,7 @@
           <a:lstStyle/>
           <a:p>
             <a:r>
-              <a:rPr lang="it-IT" sz="2500" dirty="0" smtClean="0"/>
+              <a:rPr lang="it-IT" sz="2500" dirty="0"/>
               <a:t>Gestire il sito di un casinò.</a:t>
             </a:r>
           </a:p>
@@ -7412,7 +7478,7 @@
           </a:p>
           <a:p>
             <a:r>
-              <a:rPr lang="it-IT" sz="2500" dirty="0" smtClean="0"/>
+              <a:rPr lang="it-IT" sz="2500" dirty="0"/>
               <a:t>Gestire le promozioni.</a:t>
             </a:r>
           </a:p>
@@ -7421,10 +7487,9 @@
           </a:p>
           <a:p>
             <a:r>
-              <a:rPr lang="it-IT" sz="2500" dirty="0" smtClean="0"/>
+              <a:rPr lang="it-IT" sz="2500" dirty="0"/>
               <a:t>Acquisire clienti.</a:t>
             </a:r>
-            <a:endParaRPr lang="it-IT" sz="2500" dirty="0"/>
           </a:p>
         </p:txBody>
       </p:sp>
@@ -7479,17 +7544,10 @@
   <p:clrMapOvr>
     <a:masterClrMapping/>
   </p:clrMapOvr>
-  <p:timing>
-    <p:tnLst>
-      <p:par>
-        <p:cTn id="1" dur="indefinite" restart="never" nodeType="tmRoot"/>
-      </p:par>
-    </p:tnLst>
-  </p:timing>
 </p:sld>
 </file>
 
-<file path=ppt/slides/slide7.xml><?xml version="1.0" encoding="utf-8"?>
+<file path=ppt/slides/slide8.xml><?xml version="1.0" encoding="utf-8"?>
 <p:sld xmlns:a="http://schemas.openxmlformats.org/drawingml/2006/main" xmlns:r="http://schemas.openxmlformats.org/officeDocument/2006/relationships" xmlns:p="http://schemas.openxmlformats.org/presentationml/2006/main">
   <p:cSld>
     <p:spTree>
@@ -7522,10 +7580,9 @@
           <a:lstStyle/>
           <a:p>
             <a:r>
-              <a:rPr lang="it-IT" dirty="0" smtClean="0"/>
+              <a:rPr lang="it-IT" dirty="0"/>
               <a:t>Prima cosa c’era?</a:t>
             </a:r>
-            <a:endParaRPr lang="it-IT" dirty="0"/>
           </a:p>
         </p:txBody>
       </p:sp>
@@ -7547,7 +7604,7 @@
           <a:lstStyle/>
           <a:p>
             <a:r>
-              <a:rPr lang="it-IT" sz="2500" dirty="0" smtClean="0"/>
+              <a:rPr lang="it-IT" sz="2500" dirty="0"/>
               <a:t>Tanta carta.</a:t>
             </a:r>
           </a:p>
@@ -7556,7 +7613,7 @@
           </a:p>
           <a:p>
             <a:r>
-              <a:rPr lang="it-IT" sz="2500" dirty="0" smtClean="0"/>
+              <a:rPr lang="it-IT" sz="2500" dirty="0"/>
               <a:t>Gestione impensabile.</a:t>
             </a:r>
           </a:p>
@@ -7613,17 +7670,10 @@
   <p:clrMapOvr>
     <a:masterClrMapping/>
   </p:clrMapOvr>
-  <p:timing>
-    <p:tnLst>
-      <p:par>
-        <p:cTn id="1" dur="indefinite" restart="never" nodeType="tmRoot"/>
-      </p:par>
-    </p:tnLst>
-  </p:timing>
 </p:sld>
 </file>
 
-<file path=ppt/slides/slide8.xml><?xml version="1.0" encoding="utf-8"?>
+<file path=ppt/slides/slide9.xml><?xml version="1.0" encoding="utf-8"?>
 <p:sld xmlns:a="http://schemas.openxmlformats.org/drawingml/2006/main" xmlns:r="http://schemas.openxmlformats.org/officeDocument/2006/relationships" xmlns:p="http://schemas.openxmlformats.org/presentationml/2006/main">
   <p:cSld>
     <p:spTree>
@@ -7656,10 +7706,9 @@
           <a:lstStyle/>
           <a:p>
             <a:r>
-              <a:rPr lang="it-IT" dirty="0" smtClean="0"/>
+              <a:rPr lang="it-IT" dirty="0"/>
               <a:t>Noi cosa offriamo?</a:t>
             </a:r>
-            <a:endParaRPr lang="it-IT" dirty="0"/>
           </a:p>
         </p:txBody>
       </p:sp>
@@ -7681,22 +7730,18 @@
           <a:lstStyle/>
           <a:p>
             <a:r>
-              <a:rPr lang="it-IT" sz="2500" smtClean="0"/>
+              <a:rPr lang="it-IT" sz="2500"/>
               <a:t>Rapidità.</a:t>
             </a:r>
-            <a:endParaRPr lang="it-IT" sz="2500" dirty="0" smtClean="0"/>
-          </a:p>
-          <a:p>
             <a:endParaRPr lang="it-IT" sz="2500" dirty="0"/>
           </a:p>
           <a:p>
+            <a:endParaRPr lang="it-IT" sz="2500" dirty="0"/>
+          </a:p>
+          <a:p>
             <a:r>
               <a:rPr lang="it-IT" sz="2500" dirty="0"/>
-              <a:t>S</a:t>
-            </a:r>
-            <a:r>
-              <a:rPr lang="it-IT" sz="2500" dirty="0" smtClean="0"/>
-              <a:t>icurezza.</a:t>
+              <a:t>Sicurezza.</a:t>
             </a:r>
           </a:p>
         </p:txBody>
@@ -7752,99 +7797,6 @@
   <p:clrMapOvr>
     <a:masterClrMapping/>
   </p:clrMapOvr>
-  <p:timing>
-    <p:tnLst>
-      <p:par>
-        <p:cTn id="1" dur="indefinite" restart="never" nodeType="tmRoot"/>
-      </p:par>
-    </p:tnLst>
-  </p:timing>
-</p:sld>
-</file>
-
-<file path=ppt/slides/slide9.xml><?xml version="1.0" encoding="utf-8"?>
-<p:sld xmlns:a="http://schemas.openxmlformats.org/drawingml/2006/main" xmlns:r="http://schemas.openxmlformats.org/officeDocument/2006/relationships" xmlns:p="http://schemas.openxmlformats.org/presentationml/2006/main">
-  <p:cSld>
-    <p:spTree>
-      <p:nvGrpSpPr>
-        <p:cNvPr id="1" name=""/>
-        <p:cNvGrpSpPr/>
-        <p:nvPr/>
-      </p:nvGrpSpPr>
-      <p:grpSpPr>
-        <a:xfrm>
-          <a:off x="0" y="0"/>
-          <a:ext cx="0" cy="0"/>
-          <a:chOff x="0" y="0"/>
-          <a:chExt cx="0" cy="0"/>
-        </a:xfrm>
-      </p:grpSpPr>
-      <p:sp>
-        <p:nvSpPr>
-          <p:cNvPr id="2" name="Title 1"/>
-          <p:cNvSpPr>
-            <a:spLocks noGrp="1"/>
-          </p:cNvSpPr>
-          <p:nvPr>
-            <p:ph type="title"/>
-          </p:nvPr>
-        </p:nvSpPr>
-        <p:spPr/>
-        <p:txBody>
-          <a:bodyPr/>
-          <a:lstStyle/>
-          <a:p>
-            <a:r>
-              <a:rPr lang="it-IT" dirty="0" smtClean="0"/>
-              <a:t>Frontend</a:t>
-            </a:r>
-            <a:endParaRPr lang="it-IT" dirty="0"/>
-          </a:p>
-        </p:txBody>
-      </p:sp>
-      <p:pic>
-        <p:nvPicPr>
-          <p:cNvPr id="4" name="Content Placeholder 3"/>
-          <p:cNvPicPr>
-            <a:picLocks noGrp="1" noChangeAspect="1"/>
-          </p:cNvPicPr>
-          <p:nvPr>
-            <p:ph idx="1"/>
-          </p:nvPr>
-        </p:nvPicPr>
-        <p:blipFill>
-          <a:blip r:embed="rId2"/>
-          <a:stretch>
-            <a:fillRect/>
-          </a:stretch>
-        </p:blipFill>
-        <p:spPr>
-          <a:xfrm>
-            <a:off x="1380700" y="2222500"/>
-            <a:ext cx="9430598" cy="4273550"/>
-          </a:xfrm>
-          <a:prstGeom prst="rect">
-            <a:avLst/>
-          </a:prstGeom>
-        </p:spPr>
-      </p:pic>
-    </p:spTree>
-    <p:extLst>
-      <p:ext uri="{BB962C8B-B14F-4D97-AF65-F5344CB8AC3E}">
-        <p14:creationId xmlns:p14="http://schemas.microsoft.com/office/powerpoint/2010/main" val="583128748"/>
-      </p:ext>
-    </p:extLst>
-  </p:cSld>
-  <p:clrMapOvr>
-    <a:masterClrMapping/>
-  </p:clrMapOvr>
-  <p:timing>
-    <p:tnLst>
-      <p:par>
-        <p:cTn id="1" dur="indefinite" restart="never" nodeType="tmRoot"/>
-      </p:par>
-    </p:tnLst>
-  </p:timing>
 </p:sld>
 </file>
 

</xml_diff>